<commit_message>
little changes on presentations
</commit_message>
<xml_diff>
--- a/doc/Präsentationen/Herzog_Thomas_Päsentation.pptx
+++ b/doc/Präsentationen/Herzog_Thomas_Päsentation.pptx
@@ -206,7 +206,7 @@
           <a:p>
             <a:fld id="{300AC8D6-5F1B-43CC-81CB-9EBBEF596CC8}" type="datetimeFigureOut">
               <a:rPr lang="de-DE" smtClean="0"/>
-              <a:t>17.12.2015</a:t>
+              <a:t>18.12.2015</a:t>
             </a:fld>
             <a:endParaRPr lang="de-DE"/>
           </a:p>
@@ -662,7 +662,7 @@
           <a:p>
             <a:fld id="{C9CFED7A-897F-4F5B-9F1B-004B8668C128}" type="datetime1">
               <a:rPr lang="en-US" smtClean="0"/>
-              <a:t>12/17/2015</a:t>
+              <a:t>12/18/2015</a:t>
             </a:fld>
             <a:endParaRPr lang="en-US" dirty="0"/>
           </a:p>
@@ -1001,7 +1001,7 @@
           <a:p>
             <a:fld id="{CD3BD0FE-530E-439D-B262-30C3C388AAE2}" type="datetime1">
               <a:rPr lang="en-US" smtClean="0"/>
-              <a:t>12/17/2015</a:t>
+              <a:t>12/18/2015</a:t>
             </a:fld>
             <a:endParaRPr lang="en-US" dirty="0"/>
           </a:p>
@@ -1403,7 +1403,7 @@
           <a:p>
             <a:fld id="{C8BD7306-DEA0-4F14-BF8D-D5670B0C538D}" type="datetime1">
               <a:rPr lang="en-US" smtClean="0"/>
-              <a:t>12/17/2015</a:t>
+              <a:t>12/18/2015</a:t>
             </a:fld>
             <a:endParaRPr lang="en-US" dirty="0"/>
           </a:p>
@@ -1766,7 +1766,7 @@
           <a:p>
             <a:fld id="{609E5908-2DF8-4F8A-B1D6-FEC56333ACDA}" type="datetime1">
               <a:rPr lang="en-US" smtClean="0"/>
-              <a:t>12/17/2015</a:t>
+              <a:t>12/18/2015</a:t>
             </a:fld>
             <a:endParaRPr lang="en-US" dirty="0"/>
           </a:p>
@@ -2087,7 +2087,7 @@
           <a:p>
             <a:fld id="{90B844D9-F51B-48D8-A03E-AC807F931A5B}" type="datetime1">
               <a:rPr lang="en-US" smtClean="0"/>
-              <a:t>12/17/2015</a:t>
+              <a:t>12/18/2015</a:t>
             </a:fld>
             <a:endParaRPr lang="en-US" dirty="0"/>
           </a:p>
@@ -2484,7 +2484,7 @@
           <a:p>
             <a:fld id="{2530F9BD-B664-47E4-A81F-485D647144AB}" type="datetime1">
               <a:rPr lang="en-US" smtClean="0"/>
-              <a:t>12/17/2015</a:t>
+              <a:t>12/18/2015</a:t>
             </a:fld>
             <a:endParaRPr lang="en-US" dirty="0"/>
           </a:p>
@@ -2742,7 +2742,7 @@
           <a:p>
             <a:fld id="{F3C7DE7B-97B9-4565-890C-BD1F8CD4D74B}" type="datetime1">
               <a:rPr lang="en-US" smtClean="0"/>
-              <a:t>12/17/2015</a:t>
+              <a:t>12/18/2015</a:t>
             </a:fld>
             <a:endParaRPr lang="en-US" dirty="0"/>
           </a:p>
@@ -3005,7 +3005,7 @@
           <a:p>
             <a:fld id="{BFE967F1-89A7-471D-95B2-F0608E061AB2}" type="datetime1">
               <a:rPr lang="en-US" smtClean="0"/>
-              <a:t>12/17/2015</a:t>
+              <a:t>12/18/2015</a:t>
             </a:fld>
             <a:endParaRPr lang="en-US" dirty="0"/>
           </a:p>
@@ -3268,7 +3268,7 @@
           <a:p>
             <a:fld id="{CE1D36F5-BCAF-4814-B1E0-3880CF115A39}" type="datetime1">
               <a:rPr lang="en-US" smtClean="0"/>
-              <a:t>12/17/2015</a:t>
+              <a:t>12/18/2015</a:t>
             </a:fld>
             <a:endParaRPr lang="en-US" dirty="0"/>
           </a:p>
@@ -3598,7 +3598,7 @@
           <a:p>
             <a:fld id="{B26AB869-F3BD-4BE3-B249-CD66AEAFAB45}" type="datetime1">
               <a:rPr lang="en-US" smtClean="0"/>
-              <a:t>12/17/2015</a:t>
+              <a:t>12/18/2015</a:t>
             </a:fld>
             <a:endParaRPr lang="en-US" dirty="0"/>
           </a:p>
@@ -3922,7 +3922,7 @@
           <a:p>
             <a:fld id="{5178BAB9-BF9B-4705-933A-2B0D8C5BA6BD}" type="datetime1">
               <a:rPr lang="en-US" smtClean="0"/>
-              <a:t>12/17/2015</a:t>
+              <a:t>12/18/2015</a:t>
             </a:fld>
             <a:endParaRPr lang="en-US" dirty="0"/>
           </a:p>
@@ -4380,7 +4380,7 @@
           <a:p>
             <a:fld id="{9E66E724-E8AB-49E5-A77D-01704923EAE2}" type="datetime1">
               <a:rPr lang="en-US" smtClean="0"/>
-              <a:t>12/17/2015</a:t>
+              <a:t>12/18/2015</a:t>
             </a:fld>
             <a:endParaRPr lang="en-US" dirty="0"/>
           </a:p>
@@ -4586,7 +4586,7 @@
           <a:p>
             <a:fld id="{8E95EFD9-36CE-4FDD-9A77-3666FD6ABA7A}" type="datetime1">
               <a:rPr lang="en-US" smtClean="0"/>
-              <a:t>12/17/2015</a:t>
+              <a:t>12/18/2015</a:t>
             </a:fld>
             <a:endParaRPr lang="en-US" dirty="0"/>
           </a:p>
@@ -4764,7 +4764,7 @@
           <a:p>
             <a:fld id="{CD235D2F-F939-4122-B9DD-548F5AD01693}" type="datetime1">
               <a:rPr lang="en-US" smtClean="0"/>
-              <a:t>12/17/2015</a:t>
+              <a:t>12/18/2015</a:t>
             </a:fld>
             <a:endParaRPr lang="en-US" dirty="0"/>
           </a:p>
@@ -5098,7 +5098,7 @@
           <a:p>
             <a:fld id="{07864037-E751-4535-A323-69C87E8D6896}" type="datetime1">
               <a:rPr lang="en-US" smtClean="0"/>
-              <a:t>12/17/2015</a:t>
+              <a:t>12/18/2015</a:t>
             </a:fld>
             <a:endParaRPr lang="en-US" dirty="0"/>
           </a:p>
@@ -5444,7 +5444,7 @@
           <a:p>
             <a:fld id="{52D5CD0D-2338-4F10-96FF-002347A8CBA1}" type="datetime1">
               <a:rPr lang="en-US" smtClean="0"/>
-              <a:t>12/17/2015</a:t>
+              <a:t>12/18/2015</a:t>
             </a:fld>
             <a:endParaRPr lang="en-US" dirty="0"/>
           </a:p>
@@ -7562,7 +7562,7 @@
           <a:p>
             <a:fld id="{F73A2BA8-E317-40BB-9ABB-FD49EA25F4D8}" type="datetime1">
               <a:rPr lang="en-US" smtClean="0"/>
-              <a:t>12/17/2015</a:t>
+              <a:t>12/18/2015</a:t>
             </a:fld>
             <a:endParaRPr lang="en-US" dirty="0"/>
           </a:p>
@@ -8145,15 +8145,7 @@
                   <a:schemeClr val="tx1"/>
                 </a:solidFill>
               </a:rPr>
-              <a:t>Author:    Thomas </a:t>
-            </a:r>
-            <a:r>
-              <a:rPr lang="en-US" sz="2000" dirty="0" smtClean="0">
-                <a:solidFill>
-                  <a:schemeClr val="tx1"/>
-                </a:solidFill>
-              </a:rPr>
-              <a:t>Herzog - S1310307011</a:t>
+              <a:t>Author:    Thomas Herzog - S1310307011</a:t>
             </a:r>
           </a:p>
           <a:p>
@@ -8191,15 +8183,7 @@
                   <a:schemeClr val="tx1"/>
                 </a:solidFill>
               </a:rPr>
-              <a:t>Firma: </a:t>
-            </a:r>
-            <a:r>
-              <a:rPr lang="en-US" sz="2000" dirty="0" smtClean="0">
-                <a:solidFill>
-                  <a:schemeClr val="tx1"/>
-                </a:solidFill>
-              </a:rPr>
-              <a:t>     </a:t>
+              <a:t>Firma:      </a:t>
             </a:r>
             <a:r>
               <a:rPr lang="en-US" sz="2000" dirty="0" smtClean="0"/>
@@ -8281,13 +8265,6 @@
   <p:clrMapOvr>
     <a:masterClrMapping/>
   </p:clrMapOvr>
-  <p:timing>
-    <p:tnLst>
-      <p:par>
-        <p:cTn id="1" dur="indefinite" restart="never" nodeType="tmRoot"/>
-      </p:par>
-    </p:tnLst>
-  </p:timing>
 </p:sld>
 </file>
 
@@ -8377,13 +8354,6 @@
   <p:clrMapOvr>
     <a:masterClrMapping/>
   </p:clrMapOvr>
-  <p:timing>
-    <p:tnLst>
-      <p:par>
-        <p:cTn id="1" dur="indefinite" restart="never" nodeType="tmRoot"/>
-      </p:par>
-    </p:tnLst>
-  </p:timing>
 </p:sld>
 </file>
 
@@ -8524,15 +8494,7 @@
                   <a:schemeClr val="tx1"/>
                 </a:solidFill>
               </a:rPr>
-              <a:t> </a:t>
-            </a:r>
-            <a:r>
-              <a:rPr lang="de-DE" sz="2500" dirty="0" smtClean="0">
-                <a:solidFill>
-                  <a:schemeClr val="tx1"/>
-                </a:solidFill>
-              </a:rPr>
-              <a:t>– Lieferant</a:t>
+              <a:t> – Lieferant</a:t>
             </a:r>
           </a:p>
           <a:p>
@@ -8626,13 +8588,6 @@
   <p:clrMapOvr>
     <a:masterClrMapping/>
   </p:clrMapOvr>
-  <p:timing>
-    <p:tnLst>
-      <p:par>
-        <p:cTn id="1" dur="indefinite" restart="never" nodeType="tmRoot"/>
-      </p:par>
-    </p:tnLst>
-  </p:timing>
 </p:sld>
 </file>
 
@@ -8950,13 +8905,6 @@
   <p:clrMapOvr>
     <a:masterClrMapping/>
   </p:clrMapOvr>
-  <p:timing>
-    <p:tnLst>
-      <p:par>
-        <p:cTn id="1" dur="indefinite" restart="never" nodeType="tmRoot"/>
-      </p:par>
-    </p:tnLst>
-  </p:timing>
 </p:sld>
 </file>
 
@@ -9445,13 +9393,6 @@
   <p:clrMapOvr>
     <a:masterClrMapping/>
   </p:clrMapOvr>
-  <p:timing>
-    <p:tnLst>
-      <p:par>
-        <p:cTn id="1" dur="indefinite" restart="never" nodeType="tmRoot"/>
-      </p:par>
-    </p:tnLst>
-  </p:timing>
 </p:sld>
 </file>
 
@@ -9561,11 +9502,6 @@
               </a:rPr>
               <a:t>(Schnittstelle)</a:t>
             </a:r>
-            <a:endParaRPr lang="de-DE" sz="2500" dirty="0" smtClean="0">
-              <a:solidFill>
-                <a:schemeClr val="tx1"/>
-              </a:solidFill>
-            </a:endParaRPr>
           </a:p>
           <a:p>
             <a:pPr marL="457200" indent="-457200">
@@ -9586,14 +9522,6 @@
               </a:rPr>
               <a:t>DAO</a:t>
             </a:r>
-            <a:r>
-              <a:rPr lang="de-DE" sz="2500" dirty="0" smtClean="0">
-                <a:solidFill>
-                  <a:schemeClr val="tx1"/>
-                </a:solidFill>
-              </a:rPr>
-              <a:t/>
-            </a:r>
             <a:br>
               <a:rPr lang="de-DE" sz="2500" dirty="0" smtClean="0">
                 <a:solidFill>
@@ -9609,11 +9537,6 @@
               </a:rPr>
               <a:t>(Datenzugriff)</a:t>
             </a:r>
-            <a:endParaRPr lang="de-DE" sz="2500" dirty="0">
-              <a:solidFill>
-                <a:schemeClr val="tx1"/>
-              </a:solidFill>
-            </a:endParaRPr>
           </a:p>
           <a:p>
             <a:pPr marL="457200" indent="-457200">
@@ -9736,13 +9659,6 @@
   <p:clrMapOvr>
     <a:masterClrMapping/>
   </p:clrMapOvr>
-  <p:timing>
-    <p:tnLst>
-      <p:par>
-        <p:cTn id="1" dur="indefinite" restart="never" nodeType="tmRoot"/>
-      </p:par>
-    </p:tnLst>
-  </p:timing>
 </p:sld>
 </file>
 
@@ -10073,13 +9989,6 @@
   <p:clrMapOvr>
     <a:masterClrMapping/>
   </p:clrMapOvr>
-  <p:timing>
-    <p:tnLst>
-      <p:par>
-        <p:cTn id="1" dur="indefinite" restart="never" nodeType="tmRoot"/>
-      </p:par>
-    </p:tnLst>
-  </p:timing>
 </p:sld>
 </file>
 
@@ -10160,7 +10069,7 @@
       </p:sp>
       <p:pic>
         <p:nvPicPr>
-          <p:cNvPr id="5" name="Grafik 4"/>
+          <p:cNvPr id="6" name="Grafik 5"/>
           <p:cNvPicPr>
             <a:picLocks noChangeAspect="1"/>
           </p:cNvPicPr>
@@ -10174,8 +10083,8 @@
         </p:blipFill>
         <p:spPr>
           <a:xfrm>
-            <a:off x="2589212" y="1187999"/>
-            <a:ext cx="9169401" cy="5334209"/>
+            <a:off x="2589211" y="1188000"/>
+            <a:ext cx="9365941" cy="5448544"/>
           </a:xfrm>
           <a:prstGeom prst="rect">
             <a:avLst/>
@@ -10192,13 +10101,6 @@
   <p:clrMapOvr>
     <a:masterClrMapping/>
   </p:clrMapOvr>
-  <p:timing>
-    <p:tnLst>
-      <p:par>
-        <p:cTn id="1" dur="indefinite" restart="never" nodeType="tmRoot"/>
-      </p:par>
-    </p:tnLst>
-  </p:timing>
 </p:sld>
 </file>
 
@@ -10528,13 +10430,6 @@
   <p:clrMapOvr>
     <a:masterClrMapping/>
   </p:clrMapOvr>
-  <p:timing>
-    <p:tnLst>
-      <p:par>
-        <p:cTn id="1" dur="indefinite" restart="never" nodeType="tmRoot"/>
-      </p:par>
-    </p:tnLst>
-  </p:timing>
 </p:sld>
 </file>
 
@@ -10694,13 +10589,6 @@
   <p:clrMapOvr>
     <a:masterClrMapping/>
   </p:clrMapOvr>
-  <p:timing>
-    <p:tnLst>
-      <p:par>
-        <p:cTn id="1" dur="indefinite" restart="never" nodeType="tmRoot"/>
-      </p:par>
-    </p:tnLst>
-  </p:timing>
 </p:sld>
 </file>
 

</xml_diff>

<commit_message>
Further dev on thesis
- CCMail description done
- Next step is the new concept called CleverMail
- Layout changes on old mailing db schema
- reverted overwritten presentation
</commit_message>
<xml_diff>
--- a/doc/Präsentationen/Herzog_Thomas_Päsentation.pptx
+++ b/doc/Präsentationen/Herzog_Thomas_Päsentation.pptx
@@ -5,19 +5,20 @@
     <p:sldMasterId id="2147483699" r:id="rId1"/>
   </p:sldMasterIdLst>
   <p:notesMasterIdLst>
-    <p:notesMasterId r:id="rId12"/>
+    <p:notesMasterId r:id="rId13"/>
   </p:notesMasterIdLst>
   <p:sldIdLst>
     <p:sldId id="256" r:id="rId2"/>
-    <p:sldId id="261" r:id="rId3"/>
-    <p:sldId id="257" r:id="rId4"/>
-    <p:sldId id="264" r:id="rId5"/>
-    <p:sldId id="258" r:id="rId6"/>
-    <p:sldId id="259" r:id="rId7"/>
-    <p:sldId id="260" r:id="rId8"/>
-    <p:sldId id="262" r:id="rId9"/>
-    <p:sldId id="263" r:id="rId10"/>
-    <p:sldId id="265" r:id="rId11"/>
+    <p:sldId id="266" r:id="rId3"/>
+    <p:sldId id="261" r:id="rId4"/>
+    <p:sldId id="262" r:id="rId5"/>
+    <p:sldId id="264" r:id="rId6"/>
+    <p:sldId id="265" r:id="rId7"/>
+    <p:sldId id="267" r:id="rId8"/>
+    <p:sldId id="268" r:id="rId9"/>
+    <p:sldId id="269" r:id="rId10"/>
+    <p:sldId id="270" r:id="rId11"/>
+    <p:sldId id="263" r:id="rId12"/>
   </p:sldIdLst>
   <p:sldSz cx="12192000" cy="6858000"/>
   <p:notesSz cx="6858000" cy="9144000"/>
@@ -206,7 +207,7 @@
           <a:p>
             <a:fld id="{300AC8D6-5F1B-43CC-81CB-9EBBEF596CC8}" type="datetimeFigureOut">
               <a:rPr lang="de-DE" smtClean="0"/>
-              <a:t>18.12.2015</a:t>
+              <a:t>28.12.2015</a:t>
             </a:fld>
             <a:endParaRPr lang="de-DE"/>
           </a:p>
@@ -662,7 +663,7 @@
           <a:p>
             <a:fld id="{C9CFED7A-897F-4F5B-9F1B-004B8668C128}" type="datetime1">
               <a:rPr lang="en-US" smtClean="0"/>
-              <a:t>12/18/2015</a:t>
+              <a:t>12/28/2015</a:t>
             </a:fld>
             <a:endParaRPr lang="en-US" dirty="0"/>
           </a:p>
@@ -1001,7 +1002,7 @@
           <a:p>
             <a:fld id="{CD3BD0FE-530E-439D-B262-30C3C388AAE2}" type="datetime1">
               <a:rPr lang="en-US" smtClean="0"/>
-              <a:t>12/18/2015</a:t>
+              <a:t>12/28/2015</a:t>
             </a:fld>
             <a:endParaRPr lang="en-US" dirty="0"/>
           </a:p>
@@ -1403,7 +1404,7 @@
           <a:p>
             <a:fld id="{C8BD7306-DEA0-4F14-BF8D-D5670B0C538D}" type="datetime1">
               <a:rPr lang="en-US" smtClean="0"/>
-              <a:t>12/18/2015</a:t>
+              <a:t>12/28/2015</a:t>
             </a:fld>
             <a:endParaRPr lang="en-US" dirty="0"/>
           </a:p>
@@ -1766,7 +1767,7 @@
           <a:p>
             <a:fld id="{609E5908-2DF8-4F8A-B1D6-FEC56333ACDA}" type="datetime1">
               <a:rPr lang="en-US" smtClean="0"/>
-              <a:t>12/18/2015</a:t>
+              <a:t>12/28/2015</a:t>
             </a:fld>
             <a:endParaRPr lang="en-US" dirty="0"/>
           </a:p>
@@ -2087,7 +2088,7 @@
           <a:p>
             <a:fld id="{90B844D9-F51B-48D8-A03E-AC807F931A5B}" type="datetime1">
               <a:rPr lang="en-US" smtClean="0"/>
-              <a:t>12/18/2015</a:t>
+              <a:t>12/28/2015</a:t>
             </a:fld>
             <a:endParaRPr lang="en-US" dirty="0"/>
           </a:p>
@@ -2484,7 +2485,7 @@
           <a:p>
             <a:fld id="{2530F9BD-B664-47E4-A81F-485D647144AB}" type="datetime1">
               <a:rPr lang="en-US" smtClean="0"/>
-              <a:t>12/18/2015</a:t>
+              <a:t>12/28/2015</a:t>
             </a:fld>
             <a:endParaRPr lang="en-US" dirty="0"/>
           </a:p>
@@ -2742,7 +2743,7 @@
           <a:p>
             <a:fld id="{F3C7DE7B-97B9-4565-890C-BD1F8CD4D74B}" type="datetime1">
               <a:rPr lang="en-US" smtClean="0"/>
-              <a:t>12/18/2015</a:t>
+              <a:t>12/28/2015</a:t>
             </a:fld>
             <a:endParaRPr lang="en-US" dirty="0"/>
           </a:p>
@@ -3005,7 +3006,7 @@
           <a:p>
             <a:fld id="{BFE967F1-89A7-471D-95B2-F0608E061AB2}" type="datetime1">
               <a:rPr lang="en-US" smtClean="0"/>
-              <a:t>12/18/2015</a:t>
+              <a:t>12/28/2015</a:t>
             </a:fld>
             <a:endParaRPr lang="en-US" dirty="0"/>
           </a:p>
@@ -3268,7 +3269,7 @@
           <a:p>
             <a:fld id="{CE1D36F5-BCAF-4814-B1E0-3880CF115A39}" type="datetime1">
               <a:rPr lang="en-US" smtClean="0"/>
-              <a:t>12/18/2015</a:t>
+              <a:t>12/28/2015</a:t>
             </a:fld>
             <a:endParaRPr lang="en-US" dirty="0"/>
           </a:p>
@@ -3598,7 +3599,7 @@
           <a:p>
             <a:fld id="{B26AB869-F3BD-4BE3-B249-CD66AEAFAB45}" type="datetime1">
               <a:rPr lang="en-US" smtClean="0"/>
-              <a:t>12/18/2015</a:t>
+              <a:t>12/28/2015</a:t>
             </a:fld>
             <a:endParaRPr lang="en-US" dirty="0"/>
           </a:p>
@@ -3922,7 +3923,7 @@
           <a:p>
             <a:fld id="{5178BAB9-BF9B-4705-933A-2B0D8C5BA6BD}" type="datetime1">
               <a:rPr lang="en-US" smtClean="0"/>
-              <a:t>12/18/2015</a:t>
+              <a:t>12/28/2015</a:t>
             </a:fld>
             <a:endParaRPr lang="en-US" dirty="0"/>
           </a:p>
@@ -4380,7 +4381,7 @@
           <a:p>
             <a:fld id="{9E66E724-E8AB-49E5-A77D-01704923EAE2}" type="datetime1">
               <a:rPr lang="en-US" smtClean="0"/>
-              <a:t>12/18/2015</a:t>
+              <a:t>12/28/2015</a:t>
             </a:fld>
             <a:endParaRPr lang="en-US" dirty="0"/>
           </a:p>
@@ -4586,7 +4587,7 @@
           <a:p>
             <a:fld id="{8E95EFD9-36CE-4FDD-9A77-3666FD6ABA7A}" type="datetime1">
               <a:rPr lang="en-US" smtClean="0"/>
-              <a:t>12/18/2015</a:t>
+              <a:t>12/28/2015</a:t>
             </a:fld>
             <a:endParaRPr lang="en-US" dirty="0"/>
           </a:p>
@@ -4764,7 +4765,7 @@
           <a:p>
             <a:fld id="{CD235D2F-F939-4122-B9DD-548F5AD01693}" type="datetime1">
               <a:rPr lang="en-US" smtClean="0"/>
-              <a:t>12/18/2015</a:t>
+              <a:t>12/28/2015</a:t>
             </a:fld>
             <a:endParaRPr lang="en-US" dirty="0"/>
           </a:p>
@@ -5098,7 +5099,7 @@
           <a:p>
             <a:fld id="{07864037-E751-4535-A323-69C87E8D6896}" type="datetime1">
               <a:rPr lang="en-US" smtClean="0"/>
-              <a:t>12/18/2015</a:t>
+              <a:t>12/28/2015</a:t>
             </a:fld>
             <a:endParaRPr lang="en-US" dirty="0"/>
           </a:p>
@@ -5444,7 +5445,7 @@
           <a:p>
             <a:fld id="{52D5CD0D-2338-4F10-96FF-002347A8CBA1}" type="datetime1">
               <a:rPr lang="en-US" smtClean="0"/>
-              <a:t>12/18/2015</a:t>
+              <a:t>12/28/2015</a:t>
             </a:fld>
             <a:endParaRPr lang="en-US" dirty="0"/>
           </a:p>
@@ -7562,7 +7563,7 @@
           <a:p>
             <a:fld id="{F73A2BA8-E317-40BB-9ABB-FD49EA25F4D8}" type="datetime1">
               <a:rPr lang="en-US" smtClean="0"/>
-              <a:t>12/18/2015</a:t>
+              <a:t>12/28/2015</a:t>
             </a:fld>
             <a:endParaRPr lang="en-US" dirty="0"/>
           </a:p>
@@ -8094,8 +8095,8 @@
         </p:nvSpPr>
         <p:spPr>
           <a:xfrm>
-            <a:off x="1650207" y="546377"/>
-            <a:ext cx="10484644" cy="1280890"/>
+            <a:off x="0" y="546377"/>
+            <a:ext cx="12134851" cy="1280890"/>
           </a:xfrm>
         </p:spPr>
         <p:txBody>
@@ -8104,100 +8105,16 @@
           </a:bodyPr>
           <a:lstStyle/>
           <a:p>
+            <a:pPr algn="ctr"/>
             <a:r>
               <a:rPr lang="de-DE" sz="5500" dirty="0" smtClean="0"/>
-              <a:t>Konzeption eines Mail-Service</a:t>
+              <a:t>Konzept </a:t>
+            </a:r>
+            <a:r>
+              <a:rPr lang="de-DE" sz="5500" dirty="0" err="1" smtClean="0"/>
+              <a:t>CleverMail</a:t>
             </a:r>
             <a:endParaRPr lang="de-DE" sz="5500" dirty="0"/>
-          </a:p>
-        </p:txBody>
-      </p:sp>
-      <p:sp>
-        <p:nvSpPr>
-          <p:cNvPr id="3" name="Untertitel 2"/>
-          <p:cNvSpPr>
-            <a:spLocks noGrp="1"/>
-          </p:cNvSpPr>
-          <p:nvPr>
-            <p:ph idx="1"/>
-          </p:nvPr>
-        </p:nvSpPr>
-        <p:spPr>
-          <a:xfrm>
-            <a:off x="2341961" y="2391623"/>
-            <a:ext cx="8915400" cy="2387546"/>
-          </a:xfrm>
-        </p:spPr>
-        <p:txBody>
-          <a:bodyPr>
-            <a:normAutofit/>
-          </a:bodyPr>
-          <a:lstStyle/>
-          <a:p>
-            <a:pPr>
-              <a:buClr>
-                <a:schemeClr val="tx1"/>
-              </a:buClr>
-            </a:pPr>
-            <a:r>
-              <a:rPr lang="en-US" sz="2000" dirty="0" smtClean="0">
-                <a:solidFill>
-                  <a:schemeClr val="tx1"/>
-                </a:solidFill>
-              </a:rPr>
-              <a:t>Author:    Thomas Herzog - S1310307011</a:t>
-            </a:r>
-          </a:p>
-          <a:p>
-            <a:pPr>
-              <a:buClr>
-                <a:schemeClr val="tx1"/>
-              </a:buClr>
-            </a:pPr>
-            <a:r>
-              <a:rPr lang="en-US" sz="2000" dirty="0" err="1" smtClean="0">
-                <a:solidFill>
-                  <a:schemeClr val="tx1"/>
-                </a:solidFill>
-              </a:rPr>
-              <a:t>Betreuer</a:t>
-            </a:r>
-            <a:r>
-              <a:rPr lang="en-US" sz="2000" dirty="0" smtClean="0">
-                <a:solidFill>
-                  <a:schemeClr val="tx1"/>
-                </a:solidFill>
-              </a:rPr>
-              <a:t>: FH-Prof. DI Dr. Heinz Dobler </a:t>
-            </a:r>
-          </a:p>
-          <a:p>
-            <a:pPr>
-              <a:buClr>
-                <a:schemeClr val="tx1"/>
-              </a:buClr>
-            </a:pPr>
-            <a:r>
-              <a:rPr lang="en-US" sz="2000" dirty="0" smtClean="0">
-                <a:solidFill>
-                  <a:schemeClr val="tx1"/>
-                </a:solidFill>
-              </a:rPr>
-              <a:t>Firma:      </a:t>
-            </a:r>
-            <a:r>
-              <a:rPr lang="en-US" sz="2000" dirty="0" smtClean="0"/>
-              <a:t>Curecomp </a:t>
-            </a:r>
-            <a:r>
-              <a:rPr lang="en-US" sz="2000" dirty="0"/>
-              <a:t>Software Services </a:t>
-            </a:r>
-            <a:r>
-              <a:rPr lang="en-US" sz="2000" dirty="0" smtClean="0"/>
-              <a:t>GmbH</a:t>
-            </a:r>
-            <a:endParaRPr lang="en-US" sz="2000" dirty="0"/>
           </a:p>
         </p:txBody>
       </p:sp>
@@ -8223,7 +8140,7 @@
         </p:blipFill>
         <p:spPr>
           <a:xfrm>
-            <a:off x="7094946" y="3679031"/>
+            <a:off x="3518898" y="2193131"/>
             <a:ext cx="5097054" cy="3178969"/>
           </a:xfrm>
           <a:prstGeom prst="rect">
@@ -8297,32 +8214,36 @@
         </p:nvSpPr>
         <p:spPr>
           <a:xfrm>
-            <a:off x="0" y="0"/>
-            <a:ext cx="12192000" cy="6858000"/>
+            <a:off x="0" y="10708"/>
+            <a:ext cx="12192000" cy="1005840"/>
           </a:xfrm>
         </p:spPr>
         <p:txBody>
-          <a:bodyPr anchor="ctr">
+          <a:bodyPr>
             <a:normAutofit/>
           </a:bodyPr>
           <a:lstStyle/>
           <a:p>
             <a:pPr algn="ctr"/>
             <a:r>
-              <a:rPr lang="de-DE" sz="6000" smtClean="0"/>
-              <a:t>         Fragen</a:t>
-            </a:r>
-            <a:r>
-              <a:rPr lang="de-DE" sz="6000" dirty="0" smtClean="0"/>
-              <a:t>, Anregungen ?</a:t>
-            </a:r>
-            <a:endParaRPr lang="de-DE" sz="6000" dirty="0"/>
-          </a:p>
-        </p:txBody>
-      </p:sp>
-      <p:sp>
-        <p:nvSpPr>
-          <p:cNvPr id="6" name="Foliennummernplatzhalter 5"/>
+              <a:rPr lang="de-DE" dirty="0" err="1" smtClean="0"/>
+              <a:t>CleverMail</a:t>
+            </a:r>
+            <a:r>
+              <a:rPr lang="de-DE" dirty="0"/>
+              <a:t> </a:t>
+            </a:r>
+            <a:r>
+              <a:rPr lang="de-DE" dirty="0" smtClean="0"/>
+              <a:t>DB-Schema</a:t>
+            </a:r>
+            <a:endParaRPr lang="de-DE" dirty="0"/>
+          </a:p>
+        </p:txBody>
+      </p:sp>
+      <p:sp>
+        <p:nvSpPr>
+          <p:cNvPr id="7" name="Foliennummernplatzhalter 6"/>
           <p:cNvSpPr>
             <a:spLocks noGrp="1"/>
           </p:cNvSpPr>
@@ -8344,10 +8265,278 @@
           </a:p>
         </p:txBody>
       </p:sp>
+      <p:sp>
+        <p:nvSpPr>
+          <p:cNvPr id="5" name="Textplatzhalter 2"/>
+          <p:cNvSpPr>
+            <a:spLocks noGrp="1"/>
+          </p:cNvSpPr>
+          <p:nvPr>
+            <p:ph type="body" idx="1"/>
+          </p:nvPr>
+        </p:nvSpPr>
+        <p:spPr>
+          <a:xfrm>
+            <a:off x="1638300" y="1016548"/>
+            <a:ext cx="10406063" cy="5734296"/>
+          </a:xfrm>
+        </p:spPr>
+        <p:txBody>
+          <a:bodyPr anchor="t">
+            <a:normAutofit/>
+          </a:bodyPr>
+          <a:lstStyle/>
+          <a:p>
+            <a:pPr marL="342900" indent="-342900">
+              <a:lnSpc>
+                <a:spcPct val="150000"/>
+              </a:lnSpc>
+              <a:buClrTx/>
+              <a:buFont typeface="Arial" panose="020B0604020202020204" pitchFamily="34" charset="0"/>
+              <a:buChar char="•"/>
+            </a:pPr>
+            <a:r>
+              <a:rPr lang="de-DE" sz="2000" dirty="0" smtClean="0">
+                <a:solidFill>
+                  <a:schemeClr val="tx1"/>
+                </a:solidFill>
+              </a:rPr>
+              <a:t>META-Tag für </a:t>
+            </a:r>
+            <a:r>
+              <a:rPr lang="de-DE" sz="2000" dirty="0" err="1" smtClean="0">
+                <a:solidFill>
+                  <a:schemeClr val="tx1"/>
+                </a:solidFill>
+              </a:rPr>
+              <a:t>Mailjobs</a:t>
+            </a:r>
+            <a:r>
+              <a:rPr lang="de-DE" sz="2000" dirty="0" smtClean="0">
+                <a:solidFill>
+                  <a:schemeClr val="tx1"/>
+                </a:solidFill>
+              </a:rPr>
+              <a:t> ?</a:t>
+            </a:r>
+          </a:p>
+          <a:p>
+            <a:pPr marL="342900" indent="-342900">
+              <a:lnSpc>
+                <a:spcPct val="150000"/>
+              </a:lnSpc>
+              <a:buClrTx/>
+              <a:buFont typeface="Arial" panose="020B0604020202020204" pitchFamily="34" charset="0"/>
+              <a:buChar char="•"/>
+            </a:pPr>
+            <a:r>
+              <a:rPr lang="de-DE" sz="2000" dirty="0" smtClean="0">
+                <a:solidFill>
+                  <a:schemeClr val="tx1"/>
+                </a:solidFill>
+              </a:rPr>
+              <a:t>JSON Konfigurationen auftrennen ?</a:t>
+            </a:r>
+          </a:p>
+          <a:p>
+            <a:pPr marL="342900" indent="-342900">
+              <a:lnSpc>
+                <a:spcPct val="150000"/>
+              </a:lnSpc>
+              <a:buClrTx/>
+              <a:buFont typeface="Arial" panose="020B0604020202020204" pitchFamily="34" charset="0"/>
+              <a:buChar char="•"/>
+            </a:pPr>
+            <a:r>
+              <a:rPr lang="de-DE" sz="2000" dirty="0" smtClean="0">
+                <a:solidFill>
+                  <a:schemeClr val="tx1"/>
+                </a:solidFill>
+              </a:rPr>
+              <a:t>Email Adressen in DB oder JSON ?</a:t>
+            </a:r>
+          </a:p>
+          <a:p>
+            <a:pPr marL="342900" indent="-342900">
+              <a:lnSpc>
+                <a:spcPct val="150000"/>
+              </a:lnSpc>
+              <a:buClrTx/>
+              <a:buFont typeface="Arial" panose="020B0604020202020204" pitchFamily="34" charset="0"/>
+              <a:buChar char="•"/>
+            </a:pPr>
+            <a:r>
+              <a:rPr lang="de-DE" sz="2000" dirty="0" smtClean="0">
+                <a:solidFill>
+                  <a:schemeClr val="tx1"/>
+                </a:solidFill>
+              </a:rPr>
+              <a:t>Template META-Daten in DB (verwendete Parameter) ?</a:t>
+            </a:r>
+          </a:p>
+          <a:p>
+            <a:pPr marL="342900" indent="-342900">
+              <a:lnSpc>
+                <a:spcPct val="150000"/>
+              </a:lnSpc>
+              <a:buClrTx/>
+              <a:buFont typeface="Arial" panose="020B0604020202020204" pitchFamily="34" charset="0"/>
+              <a:buChar char="•"/>
+            </a:pPr>
+            <a:r>
+              <a:rPr lang="de-DE" sz="2000" dirty="0" smtClean="0">
+                <a:solidFill>
+                  <a:schemeClr val="tx1"/>
+                </a:solidFill>
+              </a:rPr>
+              <a:t>SMTP-Response per Code oder als ein String ?</a:t>
+            </a:r>
+          </a:p>
+          <a:p>
+            <a:pPr marL="342900" indent="-342900">
+              <a:lnSpc>
+                <a:spcPct val="150000"/>
+              </a:lnSpc>
+              <a:buClrTx/>
+              <a:buFont typeface="Arial" panose="020B0604020202020204" pitchFamily="34" charset="0"/>
+              <a:buChar char="•"/>
+            </a:pPr>
+            <a:endParaRPr lang="de-DE" sz="2000" dirty="0" smtClean="0">
+              <a:solidFill>
+                <a:schemeClr val="tx1"/>
+              </a:solidFill>
+            </a:endParaRPr>
+          </a:p>
+          <a:p>
+            <a:pPr marL="342900" indent="-342900">
+              <a:lnSpc>
+                <a:spcPct val="150000"/>
+              </a:lnSpc>
+              <a:buClrTx/>
+              <a:buFont typeface="Arial" panose="020B0604020202020204" pitchFamily="34" charset="0"/>
+              <a:buChar char="•"/>
+            </a:pPr>
+            <a:endParaRPr lang="de-DE" sz="2000" dirty="0" smtClean="0">
+              <a:solidFill>
+                <a:schemeClr val="tx1"/>
+              </a:solidFill>
+            </a:endParaRPr>
+          </a:p>
+          <a:p>
+            <a:pPr marL="342900" indent="-342900">
+              <a:lnSpc>
+                <a:spcPct val="150000"/>
+              </a:lnSpc>
+              <a:buClrTx/>
+              <a:buFont typeface="Arial" panose="020B0604020202020204" pitchFamily="34" charset="0"/>
+              <a:buChar char="•"/>
+            </a:pPr>
+            <a:endParaRPr lang="de-DE" sz="2000" dirty="0" smtClean="0">
+              <a:solidFill>
+                <a:schemeClr val="tx1"/>
+              </a:solidFill>
+            </a:endParaRPr>
+          </a:p>
+          <a:p>
+            <a:pPr marL="342900" indent="-342900">
+              <a:lnSpc>
+                <a:spcPct val="200000"/>
+              </a:lnSpc>
+              <a:buClrTx/>
+              <a:buFont typeface="Arial" panose="020B0604020202020204" pitchFamily="34" charset="0"/>
+              <a:buChar char="•"/>
+            </a:pPr>
+            <a:endParaRPr lang="de-DE" sz="2000" dirty="0"/>
+          </a:p>
+        </p:txBody>
+      </p:sp>
     </p:spTree>
     <p:extLst>
       <p:ext uri="{BB962C8B-B14F-4D97-AF65-F5344CB8AC3E}">
-        <p14:creationId xmlns:p14="http://schemas.microsoft.com/office/powerpoint/2010/main" val="2378152437"/>
+        <p14:creationId xmlns:p14="http://schemas.microsoft.com/office/powerpoint/2010/main" val="1505975190"/>
+      </p:ext>
+    </p:extLst>
+  </p:cSld>
+  <p:clrMapOvr>
+    <a:masterClrMapping/>
+  </p:clrMapOvr>
+</p:sld>
+</file>
+
+<file path=ppt/slides/slide11.xml><?xml version="1.0" encoding="utf-8"?>
+<p:sld xmlns:a="http://schemas.openxmlformats.org/drawingml/2006/main" xmlns:r="http://schemas.openxmlformats.org/officeDocument/2006/relationships" xmlns:p="http://schemas.openxmlformats.org/presentationml/2006/main">
+  <p:cSld>
+    <p:spTree>
+      <p:nvGrpSpPr>
+        <p:cNvPr id="1" name=""/>
+        <p:cNvGrpSpPr/>
+        <p:nvPr/>
+      </p:nvGrpSpPr>
+      <p:grpSpPr>
+        <a:xfrm>
+          <a:off x="0" y="0"/>
+          <a:ext cx="0" cy="0"/>
+          <a:chOff x="0" y="0"/>
+          <a:chExt cx="0" cy="0"/>
+        </a:xfrm>
+      </p:grpSpPr>
+      <p:sp>
+        <p:nvSpPr>
+          <p:cNvPr id="2" name="Titel 1"/>
+          <p:cNvSpPr>
+            <a:spLocks noGrp="1"/>
+          </p:cNvSpPr>
+          <p:nvPr>
+            <p:ph type="title"/>
+          </p:nvPr>
+        </p:nvSpPr>
+        <p:spPr>
+          <a:xfrm>
+            <a:off x="0" y="0"/>
+            <a:ext cx="12192000" cy="6858000"/>
+          </a:xfrm>
+        </p:spPr>
+        <p:txBody>
+          <a:bodyPr/>
+          <a:lstStyle/>
+          <a:p>
+            <a:pPr algn="ctr"/>
+            <a:r>
+              <a:rPr lang="de-DE" smtClean="0"/>
+              <a:t>Fragen ?</a:t>
+            </a:r>
+            <a:endParaRPr lang="de-DE" dirty="0"/>
+          </a:p>
+        </p:txBody>
+      </p:sp>
+      <p:sp>
+        <p:nvSpPr>
+          <p:cNvPr id="4" name="Foliennummernplatzhalter 3"/>
+          <p:cNvSpPr>
+            <a:spLocks noGrp="1"/>
+          </p:cNvSpPr>
+          <p:nvPr>
+            <p:ph type="sldNum" sz="quarter" idx="12"/>
+          </p:nvPr>
+        </p:nvSpPr>
+        <p:spPr/>
+        <p:txBody>
+          <a:bodyPr/>
+          <a:lstStyle/>
+          <a:p>
+            <a:fld id="{D57F1E4F-1CFF-5643-939E-217C01CDF565}" type="slidenum">
+              <a:rPr lang="en-US" smtClean="0"/>
+              <a:pPr/>
+              <a:t>11</a:t>
+            </a:fld>
+            <a:endParaRPr lang="en-US" dirty="0"/>
+          </a:p>
+        </p:txBody>
+      </p:sp>
+    </p:spTree>
+    <p:extLst>
+      <p:ext uri="{BB962C8B-B14F-4D97-AF65-F5344CB8AC3E}">
+        <p14:creationId xmlns:p14="http://schemas.microsoft.com/office/powerpoint/2010/main" val="1994134706"/>
       </p:ext>
     </p:extLst>
   </p:cSld>
@@ -8386,8 +8575,8 @@
         </p:nvSpPr>
         <p:spPr>
           <a:xfrm>
-            <a:off x="2589212" y="182160"/>
-            <a:ext cx="8915399" cy="1005840"/>
+            <a:off x="0" y="10708"/>
+            <a:ext cx="12192000" cy="1005840"/>
           </a:xfrm>
         </p:spPr>
         <p:txBody>
@@ -8396,9 +8585,10 @@
           </a:bodyPr>
           <a:lstStyle/>
           <a:p>
+            <a:pPr algn="ctr"/>
             <a:r>
               <a:rPr lang="de-DE" dirty="0" smtClean="0"/>
-              <a:t>Curecomp Ökosystem</a:t>
+              <a:t>Aufbau</a:t>
             </a:r>
             <a:endParaRPr lang="de-DE" dirty="0"/>
           </a:p>
@@ -8406,133 +8596,31 @@
       </p:sp>
       <p:sp>
         <p:nvSpPr>
-          <p:cNvPr id="5" name="Textplatzhalter 8"/>
-          <p:cNvSpPr>
-            <a:spLocks noGrp="1"/>
-          </p:cNvSpPr>
-          <p:nvPr>
-            <p:ph type="body" idx="1"/>
-          </p:nvPr>
-        </p:nvSpPr>
-        <p:spPr>
-          <a:xfrm>
-            <a:off x="2589212" y="4615200"/>
-            <a:ext cx="9413188" cy="2102400"/>
-          </a:xfrm>
-        </p:spPr>
-        <p:txBody>
-          <a:bodyPr anchor="t">
-            <a:normAutofit/>
-          </a:bodyPr>
+          <p:cNvPr id="7" name="Foliennummernplatzhalter 6"/>
+          <p:cNvSpPr>
+            <a:spLocks noGrp="1"/>
+          </p:cNvSpPr>
+          <p:nvPr>
+            <p:ph type="sldNum" sz="quarter" idx="12"/>
+          </p:nvPr>
+        </p:nvSpPr>
+        <p:spPr/>
+        <p:txBody>
+          <a:bodyPr/>
           <a:lstStyle/>
           <a:p>
-            <a:pPr marL="457200" indent="-457200">
-              <a:lnSpc>
-                <a:spcPct val="110000"/>
-              </a:lnSpc>
-              <a:buClr>
-                <a:schemeClr val="tx1"/>
-              </a:buClr>
-              <a:buFont typeface="Arial" panose="020B0604020202020204" pitchFamily="34" charset="0"/>
-              <a:buChar char="•"/>
-            </a:pPr>
-            <a:r>
-              <a:rPr lang="de-DE" sz="2500" dirty="0" smtClean="0">
-                <a:solidFill>
-                  <a:schemeClr val="tx1"/>
-                </a:solidFill>
-              </a:rPr>
-              <a:t>SRM (Supplier-</a:t>
-            </a:r>
-            <a:r>
-              <a:rPr lang="de-DE" sz="2500" dirty="0" err="1" smtClean="0">
-                <a:solidFill>
-                  <a:schemeClr val="tx1"/>
-                </a:solidFill>
-              </a:rPr>
-              <a:t>Relationship</a:t>
-            </a:r>
-            <a:r>
-              <a:rPr lang="de-DE" sz="2500" dirty="0" smtClean="0">
-                <a:solidFill>
-                  <a:schemeClr val="tx1"/>
-                </a:solidFill>
-              </a:rPr>
-              <a:t>-Management)</a:t>
-            </a:r>
-          </a:p>
-          <a:p>
-            <a:pPr marL="457200" indent="-457200">
-              <a:lnSpc>
-                <a:spcPct val="110000"/>
-              </a:lnSpc>
-              <a:buClr>
-                <a:schemeClr val="tx1"/>
-              </a:buClr>
-              <a:buFont typeface="Arial" panose="020B0604020202020204" pitchFamily="34" charset="0"/>
-              <a:buChar char="•"/>
-            </a:pPr>
-            <a:r>
-              <a:rPr lang="de-DE" sz="2500" dirty="0" smtClean="0">
-                <a:solidFill>
-                  <a:schemeClr val="tx1"/>
-                </a:solidFill>
-              </a:rPr>
-              <a:t>Kunde – </a:t>
-            </a:r>
-            <a:r>
-              <a:rPr lang="de-DE" sz="2500" dirty="0" err="1" smtClean="0">
-                <a:solidFill>
-                  <a:schemeClr val="tx1"/>
-                </a:solidFill>
-              </a:rPr>
-              <a:t>clevercure</a:t>
-            </a:r>
-            <a:r>
-              <a:rPr lang="de-DE" sz="2500" dirty="0" smtClean="0">
-                <a:solidFill>
-                  <a:schemeClr val="tx1"/>
-                </a:solidFill>
-              </a:rPr>
-              <a:t> – Lieferant</a:t>
-            </a:r>
-          </a:p>
-          <a:p>
-            <a:pPr marL="457200" indent="-457200">
-              <a:lnSpc>
-                <a:spcPct val="110000"/>
-              </a:lnSpc>
-              <a:buClr>
-                <a:schemeClr val="tx1"/>
-              </a:buClr>
-              <a:buFont typeface="Arial" panose="020B0604020202020204" pitchFamily="34" charset="0"/>
-              <a:buChar char="•"/>
-            </a:pPr>
-            <a:r>
-              <a:rPr lang="de-DE" sz="2500" dirty="0" smtClean="0">
-                <a:solidFill>
-                  <a:schemeClr val="tx1"/>
-                </a:solidFill>
-              </a:rPr>
-              <a:t>E-Mail-Nachrichten essentiell</a:t>
-            </a:r>
-            <a:endParaRPr lang="de-DE" sz="2500" dirty="0" smtClean="0"/>
-          </a:p>
-          <a:p>
-            <a:pPr marL="457200" indent="-457200">
-              <a:lnSpc>
-                <a:spcPct val="110000"/>
-              </a:lnSpc>
-              <a:buFont typeface="Arial" panose="020B0604020202020204" pitchFamily="34" charset="0"/>
-              <a:buChar char="•"/>
-            </a:pPr>
-            <a:endParaRPr lang="de-DE" sz="2500" dirty="0"/>
+            <a:fld id="{D57F1E4F-1CFF-5643-939E-217C01CDF565}" type="slidenum">
+              <a:rPr lang="en-US" b="1" smtClean="0"/>
+              <a:pPr/>
+              <a:t>2</a:t>
+            </a:fld>
+            <a:endParaRPr lang="en-US" b="1" dirty="0"/>
           </a:p>
         </p:txBody>
       </p:sp>
       <p:pic>
         <p:nvPicPr>
-          <p:cNvPr id="6" name="Grafik 5"/>
+          <p:cNvPr id="4" name="Grafik 3"/>
           <p:cNvPicPr>
             <a:picLocks noChangeAspect="1"/>
           </p:cNvPicPr>
@@ -8546,8 +8634,8 @@
         </p:blipFill>
         <p:spPr>
           <a:xfrm>
-            <a:off x="3225007" y="1519556"/>
-            <a:ext cx="6765856" cy="2764088"/>
+            <a:off x="1668198" y="1016548"/>
+            <a:ext cx="10382900" cy="2719634"/>
           </a:xfrm>
           <a:prstGeom prst="rect">
             <a:avLst/>
@@ -8556,32 +8644,71 @@
       </p:pic>
       <p:sp>
         <p:nvSpPr>
-          <p:cNvPr id="7" name="Foliennummernplatzhalter 6"/>
-          <p:cNvSpPr>
-            <a:spLocks noGrp="1"/>
-          </p:cNvSpPr>
-          <p:nvPr>
-            <p:ph type="sldNum" sz="quarter" idx="12"/>
-          </p:nvPr>
-        </p:nvSpPr>
-        <p:spPr/>
-        <p:txBody>
-          <a:bodyPr/>
+          <p:cNvPr id="5" name="Textfeld 4"/>
+          <p:cNvSpPr txBox="1"/>
+          <p:nvPr/>
+        </p:nvSpPr>
+        <p:spPr>
+          <a:xfrm>
+            <a:off x="1668198" y="4129086"/>
+            <a:ext cx="10319015" cy="1938992"/>
+          </a:xfrm>
+          <a:prstGeom prst="rect">
+            <a:avLst/>
+          </a:prstGeom>
+          <a:noFill/>
+        </p:spPr>
+        <p:txBody>
+          <a:bodyPr wrap="square" rtlCol="0">
+            <a:spAutoFit/>
+          </a:bodyPr>
           <a:lstStyle/>
           <a:p>
-            <a:fld id="{D57F1E4F-1CFF-5643-939E-217C01CDF565}" type="slidenum">
-              <a:rPr lang="en-US" b="1" smtClean="0"/>
-              <a:pPr/>
-              <a:t>2</a:t>
-            </a:fld>
-            <a:endParaRPr lang="en-US" b="1" dirty="0"/>
+            <a:pPr marL="342900" indent="-342900">
+              <a:lnSpc>
+                <a:spcPct val="200000"/>
+              </a:lnSpc>
+              <a:buFont typeface="Arial" panose="020B0604020202020204" pitchFamily="34" charset="0"/>
+              <a:buChar char="•"/>
+            </a:pPr>
+            <a:r>
+              <a:rPr lang="de-DE" sz="2000" dirty="0" smtClean="0"/>
+              <a:t>Einheitliche Schnittstellen</a:t>
+            </a:r>
+          </a:p>
+          <a:p>
+            <a:pPr marL="342900" indent="-342900">
+              <a:lnSpc>
+                <a:spcPct val="200000"/>
+              </a:lnSpc>
+              <a:buFont typeface="Arial" panose="020B0604020202020204" pitchFamily="34" charset="0"/>
+              <a:buChar char="•"/>
+            </a:pPr>
+            <a:r>
+              <a:rPr lang="de-DE" sz="2000" dirty="0" smtClean="0"/>
+              <a:t>Kein direkter Zugriff auf Datenbank oder Mail-Server</a:t>
+            </a:r>
+          </a:p>
+          <a:p>
+            <a:pPr marL="342900" indent="-342900">
+              <a:lnSpc>
+                <a:spcPct val="200000"/>
+              </a:lnSpc>
+              <a:buFont typeface="Arial" panose="020B0604020202020204" pitchFamily="34" charset="0"/>
+              <a:buChar char="•"/>
+            </a:pPr>
+            <a:r>
+              <a:rPr lang="de-DE" sz="2000" dirty="0" smtClean="0"/>
+              <a:t>Kopplung durch REST-Client-API oder EJB (DAO)</a:t>
+            </a:r>
+            <a:endParaRPr lang="de-DE" sz="2000" dirty="0"/>
           </a:p>
         </p:txBody>
       </p:sp>
     </p:spTree>
     <p:extLst>
       <p:ext uri="{BB962C8B-B14F-4D97-AF65-F5344CB8AC3E}">
-        <p14:creationId xmlns:p14="http://schemas.microsoft.com/office/powerpoint/2010/main" val="2706178149"/>
+        <p14:creationId xmlns:p14="http://schemas.microsoft.com/office/powerpoint/2010/main" val="1320707857"/>
       </p:ext>
     </p:extLst>
   </p:cSld>
@@ -8610,7 +8737,7 @@
       </p:grpSpPr>
       <p:sp>
         <p:nvSpPr>
-          <p:cNvPr id="8" name="Titel 7"/>
+          <p:cNvPr id="2" name="Titel 1"/>
           <p:cNvSpPr>
             <a:spLocks noGrp="1"/>
           </p:cNvSpPr>
@@ -8620,260 +8747,28 @@
         </p:nvSpPr>
         <p:spPr>
           <a:xfrm>
-            <a:off x="2589212" y="206400"/>
-            <a:ext cx="8915399" cy="1005840"/>
+            <a:off x="0" y="10708"/>
+            <a:ext cx="12192000" cy="1005840"/>
           </a:xfrm>
         </p:spPr>
         <p:txBody>
-          <a:bodyPr anchor="t"/>
-          <a:lstStyle/>
-          <a:p>
-            <a:r>
-              <a:rPr lang="de-DE" dirty="0" smtClean="0"/>
-              <a:t>Intention</a:t>
-            </a:r>
-            <a:endParaRPr lang="de-DE" dirty="0"/>
-          </a:p>
-        </p:txBody>
-      </p:sp>
-      <p:sp>
-        <p:nvSpPr>
-          <p:cNvPr id="9" name="Textplatzhalter 8"/>
-          <p:cNvSpPr>
-            <a:spLocks noGrp="1"/>
-          </p:cNvSpPr>
-          <p:nvPr>
-            <p:ph type="body" idx="1"/>
-          </p:nvPr>
-        </p:nvSpPr>
-        <p:spPr>
-          <a:xfrm>
-            <a:off x="2589212" y="1670400"/>
-            <a:ext cx="9506788" cy="5187600"/>
-          </a:xfrm>
-        </p:spPr>
-        <p:txBody>
-          <a:bodyPr anchor="t">
+          <a:bodyPr>
             <a:normAutofit/>
           </a:bodyPr>
           <a:lstStyle/>
           <a:p>
-            <a:pPr marL="457200" indent="-457200">
-              <a:lnSpc>
-                <a:spcPct val="110000"/>
-              </a:lnSpc>
-              <a:buClr>
-                <a:schemeClr val="tx1"/>
-              </a:buClr>
-              <a:buFont typeface="Arial" panose="020B0604020202020204" pitchFamily="34" charset="0"/>
-              <a:buChar char="•"/>
-            </a:pPr>
-            <a:r>
-              <a:rPr lang="de-DE" sz="2500" dirty="0" smtClean="0">
-                <a:solidFill>
-                  <a:schemeClr val="tx1"/>
-                </a:solidFill>
-              </a:rPr>
-              <a:t>Vorbereitung für die praktische Bachelorarbeit</a:t>
-            </a:r>
-            <a:endParaRPr lang="de-DE" sz="2500" dirty="0">
-              <a:solidFill>
-                <a:schemeClr val="tx1"/>
-              </a:solidFill>
-            </a:endParaRPr>
-          </a:p>
-          <a:p>
-            <a:pPr marL="457200" indent="-457200">
-              <a:lnSpc>
-                <a:spcPct val="110000"/>
-              </a:lnSpc>
-              <a:buClr>
-                <a:schemeClr val="tx1"/>
-              </a:buClr>
-              <a:buFont typeface="Arial" panose="020B0604020202020204" pitchFamily="34" charset="0"/>
-              <a:buChar char="•"/>
-            </a:pPr>
-            <a:r>
-              <a:rPr lang="de-DE" sz="2500" dirty="0">
-                <a:solidFill>
-                  <a:schemeClr val="tx1"/>
-                </a:solidFill>
-              </a:rPr>
-              <a:t>Neue </a:t>
-            </a:r>
-            <a:r>
-              <a:rPr lang="de-DE" sz="2500" dirty="0" smtClean="0">
-                <a:solidFill>
-                  <a:schemeClr val="tx1"/>
-                </a:solidFill>
-              </a:rPr>
-              <a:t>Anforderungen</a:t>
-            </a:r>
-          </a:p>
-          <a:p>
-            <a:pPr marL="457200" indent="-457200">
-              <a:lnSpc>
-                <a:spcPct val="110000"/>
-              </a:lnSpc>
-              <a:buClr>
-                <a:schemeClr val="tx1"/>
-              </a:buClr>
-              <a:buFont typeface="Arial" panose="020B0604020202020204" pitchFamily="34" charset="0"/>
-              <a:buChar char="•"/>
-            </a:pPr>
-            <a:r>
-              <a:rPr lang="de-DE" sz="2500" dirty="0" err="1" smtClean="0">
-                <a:solidFill>
-                  <a:schemeClr val="tx1"/>
-                </a:solidFill>
-              </a:rPr>
-              <a:t>CCMail</a:t>
-            </a:r>
-            <a:r>
-              <a:rPr lang="de-DE" sz="2500" dirty="0" smtClean="0">
-                <a:solidFill>
-                  <a:schemeClr val="tx1"/>
-                </a:solidFill>
-              </a:rPr>
-              <a:t> nicht anpassbar</a:t>
-            </a:r>
-            <a:endParaRPr lang="de-DE" sz="2500" dirty="0">
-              <a:solidFill>
-                <a:schemeClr val="tx1"/>
-              </a:solidFill>
-            </a:endParaRPr>
-          </a:p>
-          <a:p>
-            <a:pPr marL="457200" indent="-457200">
-              <a:lnSpc>
-                <a:spcPct val="110000"/>
-              </a:lnSpc>
-              <a:buClr>
-                <a:schemeClr val="tx1"/>
-              </a:buClr>
-              <a:buFont typeface="Arial" panose="020B0604020202020204" pitchFamily="34" charset="0"/>
-              <a:buChar char="•"/>
-            </a:pPr>
-            <a:r>
-              <a:rPr lang="de-DE" sz="2500" dirty="0" smtClean="0">
-                <a:solidFill>
-                  <a:schemeClr val="tx1"/>
-                </a:solidFill>
-              </a:rPr>
-              <a:t>Designanalyse </a:t>
-            </a:r>
-            <a:r>
-              <a:rPr lang="de-DE" sz="2500" dirty="0" err="1" smtClean="0">
-                <a:solidFill>
-                  <a:schemeClr val="tx1"/>
-                </a:solidFill>
-              </a:rPr>
-              <a:t>CCMail</a:t>
-            </a:r>
-            <a:endParaRPr lang="de-DE" sz="2500" dirty="0" smtClean="0">
-              <a:solidFill>
-                <a:schemeClr val="tx1"/>
-              </a:solidFill>
-            </a:endParaRPr>
-          </a:p>
-          <a:p>
-            <a:pPr marL="457200" indent="-457200">
-              <a:lnSpc>
-                <a:spcPct val="110000"/>
-              </a:lnSpc>
-              <a:buClr>
-                <a:schemeClr val="tx1"/>
-              </a:buClr>
-              <a:buFont typeface="Arial" panose="020B0604020202020204" pitchFamily="34" charset="0"/>
-              <a:buChar char="•"/>
-            </a:pPr>
-            <a:r>
-              <a:rPr lang="de-DE" sz="2500" dirty="0" smtClean="0">
-                <a:solidFill>
-                  <a:schemeClr val="tx1"/>
-                </a:solidFill>
-              </a:rPr>
-              <a:t>Konzept </a:t>
-            </a:r>
-            <a:r>
-              <a:rPr lang="de-DE" sz="2500" dirty="0" err="1" smtClean="0">
-                <a:solidFill>
-                  <a:schemeClr val="tx1"/>
-                </a:solidFill>
-              </a:rPr>
-              <a:t>CleverMail</a:t>
-            </a:r>
-            <a:endParaRPr lang="de-DE" sz="2500" dirty="0" smtClean="0">
-              <a:solidFill>
-                <a:schemeClr val="tx1"/>
-              </a:solidFill>
-            </a:endParaRPr>
-          </a:p>
-          <a:p>
-            <a:pPr marL="914400" lvl="1" indent="-457200">
-              <a:lnSpc>
-                <a:spcPct val="110000"/>
-              </a:lnSpc>
-              <a:buClr>
-                <a:schemeClr val="tx1"/>
-              </a:buClr>
-              <a:buFont typeface="Arial" panose="020B0604020202020204" pitchFamily="34" charset="0"/>
-              <a:buChar char="•"/>
-            </a:pPr>
-            <a:r>
-              <a:rPr lang="de-DE" sz="2500" dirty="0" smtClean="0">
-                <a:solidFill>
-                  <a:schemeClr val="tx1"/>
-                </a:solidFill>
-              </a:rPr>
-              <a:t>Architektur</a:t>
-            </a:r>
-          </a:p>
-          <a:p>
-            <a:pPr marL="914400" lvl="1" indent="-457200">
-              <a:lnSpc>
-                <a:spcPct val="110000"/>
-              </a:lnSpc>
-              <a:buClr>
-                <a:schemeClr val="tx1"/>
-              </a:buClr>
-              <a:buFont typeface="Arial" panose="020B0604020202020204" pitchFamily="34" charset="0"/>
-              <a:buChar char="•"/>
-            </a:pPr>
-            <a:r>
-              <a:rPr lang="de-DE" sz="2500" dirty="0" smtClean="0">
-                <a:solidFill>
-                  <a:schemeClr val="tx1"/>
-                </a:solidFill>
-              </a:rPr>
-              <a:t>Softwaredesign</a:t>
-            </a:r>
-          </a:p>
-          <a:p>
-            <a:pPr marL="914400" lvl="1" indent="-457200">
-              <a:lnSpc>
-                <a:spcPct val="110000"/>
-              </a:lnSpc>
-              <a:buClr>
-                <a:schemeClr val="tx1"/>
-              </a:buClr>
-              <a:buFont typeface="Arial" panose="020B0604020202020204" pitchFamily="34" charset="0"/>
-              <a:buChar char="•"/>
-            </a:pPr>
-            <a:r>
-              <a:rPr lang="de-DE" sz="2500" dirty="0" smtClean="0">
-                <a:solidFill>
-                  <a:schemeClr val="tx1"/>
-                </a:solidFill>
-              </a:rPr>
-              <a:t>Integration in Ökosystem</a:t>
-            </a:r>
-          </a:p>
-        </p:txBody>
-      </p:sp>
-      <p:sp>
-        <p:nvSpPr>
-          <p:cNvPr id="5" name="Foliennummernplatzhalter 4"/>
+            <a:pPr algn="ctr"/>
+            <a:r>
+              <a:rPr lang="de-DE" dirty="0" smtClean="0"/>
+              <a:t>REST-Service mit TCC</a:t>
+            </a:r>
+            <a:endParaRPr lang="de-DE" dirty="0"/>
+          </a:p>
+        </p:txBody>
+      </p:sp>
+      <p:sp>
+        <p:nvSpPr>
+          <p:cNvPr id="7" name="Foliennummernplatzhalter 6"/>
           <p:cNvSpPr>
             <a:spLocks noGrp="1"/>
           </p:cNvSpPr>
@@ -8895,10 +8790,34 @@
           </a:p>
         </p:txBody>
       </p:sp>
+      <p:pic>
+        <p:nvPicPr>
+          <p:cNvPr id="12" name="Grafik 11"/>
+          <p:cNvPicPr>
+            <a:picLocks noChangeAspect="1"/>
+          </p:cNvPicPr>
+          <p:nvPr/>
+        </p:nvPicPr>
+        <p:blipFill>
+          <a:blip r:embed="rId2"/>
+          <a:stretch>
+            <a:fillRect/>
+          </a:stretch>
+        </p:blipFill>
+        <p:spPr>
+          <a:xfrm>
+            <a:off x="1914260" y="1016548"/>
+            <a:ext cx="10143224" cy="5619996"/>
+          </a:xfrm>
+          <a:prstGeom prst="rect">
+            <a:avLst/>
+          </a:prstGeom>
+        </p:spPr>
+      </p:pic>
     </p:spTree>
     <p:extLst>
       <p:ext uri="{BB962C8B-B14F-4D97-AF65-F5344CB8AC3E}">
-        <p14:creationId xmlns:p14="http://schemas.microsoft.com/office/powerpoint/2010/main" val="3357467725"/>
+        <p14:creationId xmlns:p14="http://schemas.microsoft.com/office/powerpoint/2010/main" val="2706178149"/>
       </p:ext>
     </p:extLst>
   </p:cSld>
@@ -8927,7 +8846,7 @@
       </p:grpSpPr>
       <p:sp>
         <p:nvSpPr>
-          <p:cNvPr id="8" name="Titel 7"/>
+          <p:cNvPr id="2" name="Titel 1"/>
           <p:cNvSpPr>
             <a:spLocks noGrp="1"/>
           </p:cNvSpPr>
@@ -8937,431 +8856,28 @@
         </p:nvSpPr>
         <p:spPr>
           <a:xfrm>
-            <a:off x="2589212" y="206400"/>
-            <a:ext cx="8915399" cy="1005840"/>
+            <a:off x="0" y="10708"/>
+            <a:ext cx="12192000" cy="1005840"/>
           </a:xfrm>
         </p:spPr>
         <p:txBody>
-          <a:bodyPr anchor="t"/>
-          <a:lstStyle/>
-          <a:p>
-            <a:r>
-              <a:rPr lang="de-DE" dirty="0" smtClean="0"/>
-              <a:t>Literatur</a:t>
-            </a:r>
-            <a:endParaRPr lang="de-DE" dirty="0"/>
-          </a:p>
-        </p:txBody>
-      </p:sp>
-      <p:sp>
-        <p:nvSpPr>
-          <p:cNvPr id="9" name="Textplatzhalter 8"/>
-          <p:cNvSpPr>
-            <a:spLocks noGrp="1"/>
-          </p:cNvSpPr>
-          <p:nvPr>
-            <p:ph type="body" idx="1"/>
-          </p:nvPr>
-        </p:nvSpPr>
-        <p:spPr>
-          <a:xfrm>
-            <a:off x="2589212" y="1670400"/>
-            <a:ext cx="9506788" cy="2701575"/>
-          </a:xfrm>
-        </p:spPr>
-        <p:txBody>
-          <a:bodyPr anchor="t">
+          <a:bodyPr>
             <a:normAutofit/>
           </a:bodyPr>
           <a:lstStyle/>
           <a:p>
-            <a:pPr marL="457200" indent="-457200">
-              <a:lnSpc>
-                <a:spcPct val="110000"/>
-              </a:lnSpc>
-              <a:buClrTx/>
-              <a:buFont typeface="Arial" panose="020B0604020202020204" pitchFamily="34" charset="0"/>
-              <a:buChar char="•"/>
-            </a:pPr>
-            <a:r>
-              <a:rPr lang="de-DE" sz="2500" dirty="0" err="1" smtClean="0">
-                <a:solidFill>
-                  <a:schemeClr val="tx1"/>
-                </a:solidFill>
-              </a:rPr>
-              <a:t>Refactoring</a:t>
-            </a:r>
-            <a:r>
-              <a:rPr lang="de-DE" sz="2500" dirty="0" smtClean="0">
-                <a:solidFill>
-                  <a:schemeClr val="tx1"/>
-                </a:solidFill>
-              </a:rPr>
-              <a:t> Databases</a:t>
-            </a:r>
-            <a:br>
-              <a:rPr lang="de-DE" sz="2500" dirty="0" smtClean="0">
-                <a:solidFill>
-                  <a:schemeClr val="tx1"/>
-                </a:solidFill>
-              </a:rPr>
-            </a:br>
-            <a:r>
-              <a:rPr lang="de-DE" dirty="0" smtClean="0">
-                <a:solidFill>
-                  <a:schemeClr val="tx1"/>
-                </a:solidFill>
-              </a:rPr>
-              <a:t>(Scott </a:t>
-            </a:r>
-            <a:r>
-              <a:rPr lang="de-DE" dirty="0" err="1" smtClean="0">
-                <a:solidFill>
-                  <a:schemeClr val="tx1"/>
-                </a:solidFill>
-              </a:rPr>
-              <a:t>W.Ambler</a:t>
-            </a:r>
-            <a:r>
-              <a:rPr lang="de-DE" dirty="0" smtClean="0">
-                <a:solidFill>
-                  <a:schemeClr val="tx1"/>
-                </a:solidFill>
-              </a:rPr>
-              <a:t>, </a:t>
-            </a:r>
-            <a:r>
-              <a:rPr lang="de-DE" dirty="0" err="1" smtClean="0">
-                <a:solidFill>
-                  <a:schemeClr val="tx1"/>
-                </a:solidFill>
-              </a:rPr>
-              <a:t>Pramond</a:t>
-            </a:r>
-            <a:r>
-              <a:rPr lang="de-DE" dirty="0" smtClean="0">
-                <a:solidFill>
-                  <a:schemeClr val="tx1"/>
-                </a:solidFill>
-              </a:rPr>
-              <a:t> </a:t>
-            </a:r>
-            <a:r>
-              <a:rPr lang="de-DE" dirty="0" err="1" smtClean="0">
-                <a:solidFill>
-                  <a:schemeClr val="tx1"/>
-                </a:solidFill>
-              </a:rPr>
-              <a:t>J.Sadalage</a:t>
-            </a:r>
-            <a:r>
-              <a:rPr lang="de-DE" dirty="0" smtClean="0">
-                <a:solidFill>
-                  <a:schemeClr val="tx1"/>
-                </a:solidFill>
-              </a:rPr>
-              <a:t> [ISBN 0-321-29353-3])</a:t>
-            </a:r>
-            <a:endParaRPr lang="de-DE" dirty="0">
-              <a:solidFill>
-                <a:schemeClr val="tx1"/>
-              </a:solidFill>
-            </a:endParaRPr>
-          </a:p>
-          <a:p>
-            <a:pPr marL="457200" indent="-457200">
-              <a:lnSpc>
-                <a:spcPct val="110000"/>
-              </a:lnSpc>
-              <a:buClrTx/>
-              <a:buFont typeface="Arial" panose="020B0604020202020204" pitchFamily="34" charset="0"/>
-              <a:buChar char="•"/>
-            </a:pPr>
-            <a:r>
-              <a:rPr lang="de-DE" sz="2500" dirty="0" err="1" smtClean="0">
-                <a:solidFill>
-                  <a:schemeClr val="tx1"/>
-                </a:solidFill>
-              </a:rPr>
-              <a:t>Refactoring</a:t>
-            </a:r>
-            <a:r>
-              <a:rPr lang="de-DE" sz="2500" dirty="0" smtClean="0">
-                <a:solidFill>
-                  <a:schemeClr val="tx1"/>
-                </a:solidFill>
-              </a:rPr>
-              <a:t> </a:t>
-            </a:r>
-            <a:r>
-              <a:rPr lang="de-DE" sz="2500" dirty="0" err="1" smtClean="0">
-                <a:solidFill>
-                  <a:schemeClr val="tx1"/>
-                </a:solidFill>
-              </a:rPr>
-              <a:t>To</a:t>
-            </a:r>
-            <a:r>
-              <a:rPr lang="de-DE" sz="2500" dirty="0" smtClean="0">
-                <a:solidFill>
-                  <a:schemeClr val="tx1"/>
-                </a:solidFill>
-              </a:rPr>
-              <a:t> Patterns</a:t>
-            </a:r>
-            <a:br>
-              <a:rPr lang="de-DE" sz="2500" dirty="0" smtClean="0">
-                <a:solidFill>
-                  <a:schemeClr val="tx1"/>
-                </a:solidFill>
-              </a:rPr>
-            </a:br>
-            <a:r>
-              <a:rPr lang="de-DE" dirty="0" smtClean="0">
-                <a:solidFill>
-                  <a:schemeClr val="tx1"/>
-                </a:solidFill>
-              </a:rPr>
-              <a:t>(Joshua </a:t>
-            </a:r>
-            <a:r>
-              <a:rPr lang="de-DE" dirty="0" err="1" smtClean="0">
-                <a:solidFill>
-                  <a:schemeClr val="tx1"/>
-                </a:solidFill>
-              </a:rPr>
-              <a:t>Kerievsky</a:t>
-            </a:r>
-            <a:r>
-              <a:rPr lang="de-DE" dirty="0" smtClean="0">
-                <a:solidFill>
-                  <a:schemeClr val="tx1"/>
-                </a:solidFill>
-              </a:rPr>
-              <a:t> [ISBN 0-321-21335-1])</a:t>
-            </a:r>
-            <a:endParaRPr lang="de-DE" dirty="0">
-              <a:solidFill>
-                <a:schemeClr val="tx1"/>
-              </a:solidFill>
-            </a:endParaRPr>
-          </a:p>
-          <a:p>
-            <a:pPr marL="457200" indent="-457200">
-              <a:lnSpc>
-                <a:spcPct val="110000"/>
-              </a:lnSpc>
-              <a:buClrTx/>
-              <a:buFont typeface="Arial" panose="020B0604020202020204" pitchFamily="34" charset="0"/>
-              <a:buChar char="•"/>
-            </a:pPr>
-            <a:r>
-              <a:rPr lang="de-DE" sz="2500" dirty="0" smtClean="0">
-                <a:solidFill>
-                  <a:schemeClr val="tx1"/>
-                </a:solidFill>
-              </a:rPr>
-              <a:t>Patterns </a:t>
-            </a:r>
-            <a:r>
-              <a:rPr lang="de-DE" sz="2500" dirty="0" err="1" smtClean="0">
-                <a:solidFill>
-                  <a:schemeClr val="tx1"/>
-                </a:solidFill>
-              </a:rPr>
-              <a:t>of</a:t>
-            </a:r>
-            <a:r>
-              <a:rPr lang="de-DE" sz="2500" dirty="0" smtClean="0">
-                <a:solidFill>
-                  <a:schemeClr val="tx1"/>
-                </a:solidFill>
-              </a:rPr>
-              <a:t> </a:t>
-            </a:r>
-            <a:r>
-              <a:rPr lang="de-DE" sz="2500" dirty="0" err="1" smtClean="0">
-                <a:solidFill>
-                  <a:schemeClr val="tx1"/>
-                </a:solidFill>
-              </a:rPr>
-              <a:t>Enteprise</a:t>
-            </a:r>
-            <a:r>
-              <a:rPr lang="de-DE" sz="2500" dirty="0" smtClean="0">
-                <a:solidFill>
-                  <a:schemeClr val="tx1"/>
-                </a:solidFill>
-              </a:rPr>
-              <a:t> </a:t>
-            </a:r>
-            <a:r>
-              <a:rPr lang="de-DE" sz="2500" dirty="0" err="1" smtClean="0">
-                <a:solidFill>
-                  <a:schemeClr val="tx1"/>
-                </a:solidFill>
-              </a:rPr>
-              <a:t>Application</a:t>
-            </a:r>
-            <a:r>
-              <a:rPr lang="de-DE" sz="2500" dirty="0" smtClean="0">
-                <a:solidFill>
-                  <a:schemeClr val="tx1"/>
-                </a:solidFill>
-              </a:rPr>
-              <a:t> </a:t>
-            </a:r>
-            <a:r>
-              <a:rPr lang="de-DE" sz="2500" dirty="0" err="1" smtClean="0">
-                <a:solidFill>
-                  <a:schemeClr val="tx1"/>
-                </a:solidFill>
-              </a:rPr>
-              <a:t>Architecture</a:t>
-            </a:r>
-            <a:r>
-              <a:rPr lang="de-DE" sz="2500" dirty="0" smtClean="0">
-                <a:solidFill>
-                  <a:schemeClr val="tx1"/>
-                </a:solidFill>
-              </a:rPr>
-              <a:t/>
-            </a:r>
-            <a:br>
-              <a:rPr lang="de-DE" sz="2500" dirty="0" smtClean="0">
-                <a:solidFill>
-                  <a:schemeClr val="tx1"/>
-                </a:solidFill>
-              </a:rPr>
-            </a:br>
-            <a:r>
-              <a:rPr lang="de-DE" dirty="0" smtClean="0">
-                <a:solidFill>
-                  <a:schemeClr val="tx1"/>
-                </a:solidFill>
-              </a:rPr>
-              <a:t>(Martin Fowler [</a:t>
-            </a:r>
-            <a:r>
-              <a:rPr lang="en-US" dirty="0" smtClean="0">
-                <a:solidFill>
-                  <a:schemeClr val="tx1"/>
-                </a:solidFill>
-              </a:rPr>
-              <a:t>ISBN </a:t>
-            </a:r>
-            <a:r>
-              <a:rPr lang="en-US" dirty="0">
-                <a:solidFill>
-                  <a:schemeClr val="tx1"/>
-                </a:solidFill>
-              </a:rPr>
-              <a:t>0-321-12742-0</a:t>
-            </a:r>
-            <a:r>
-              <a:rPr lang="de-DE" dirty="0" smtClean="0">
-                <a:solidFill>
-                  <a:schemeClr val="tx1"/>
-                </a:solidFill>
-              </a:rPr>
-              <a:t>])</a:t>
-            </a:r>
-          </a:p>
-        </p:txBody>
-      </p:sp>
-      <p:pic>
-        <p:nvPicPr>
-          <p:cNvPr id="3" name="Grafik 2"/>
-          <p:cNvPicPr>
-            <a:picLocks noChangeAspect="1"/>
-          </p:cNvPicPr>
-          <p:nvPr/>
-        </p:nvPicPr>
-        <p:blipFill>
-          <a:blip r:embed="rId2">
-            <a:extLst>
-              <a:ext uri="{28A0092B-C50C-407E-A947-70E740481C1C}">
-                <a14:useLocalDpi xmlns:a14="http://schemas.microsoft.com/office/drawing/2010/main" val="0"/>
-              </a:ext>
-            </a:extLst>
-          </a:blip>
-          <a:stretch>
-            <a:fillRect/>
-          </a:stretch>
-        </p:blipFill>
-        <p:spPr>
-          <a:xfrm>
-            <a:off x="3166449" y="4371975"/>
-            <a:ext cx="1798460" cy="2377564"/>
-          </a:xfrm>
-          <a:prstGeom prst="rect">
-            <a:avLst/>
-          </a:prstGeom>
-        </p:spPr>
-      </p:pic>
-      <p:pic>
-        <p:nvPicPr>
-          <p:cNvPr id="4" name="Grafik 3"/>
-          <p:cNvPicPr>
-            <a:picLocks noChangeAspect="1"/>
-          </p:cNvPicPr>
-          <p:nvPr/>
-        </p:nvPicPr>
-        <p:blipFill>
-          <a:blip r:embed="rId3">
-            <a:extLst>
-              <a:ext uri="{28A0092B-C50C-407E-A947-70E740481C1C}">
-                <a14:useLocalDpi xmlns:a14="http://schemas.microsoft.com/office/drawing/2010/main" val="0"/>
-              </a:ext>
-            </a:extLst>
-          </a:blip>
-          <a:stretch>
-            <a:fillRect/>
-          </a:stretch>
-        </p:blipFill>
-        <p:spPr>
-          <a:xfrm>
-            <a:off x="5287681" y="4371976"/>
-            <a:ext cx="1684621" cy="2377564"/>
-          </a:xfrm>
-          <a:prstGeom prst="rect">
-            <a:avLst/>
-          </a:prstGeom>
-        </p:spPr>
-      </p:pic>
-      <p:pic>
-        <p:nvPicPr>
-          <p:cNvPr id="5" name="Grafik 4"/>
-          <p:cNvPicPr>
-            <a:picLocks noChangeAspect="1"/>
-          </p:cNvPicPr>
-          <p:nvPr/>
-        </p:nvPicPr>
-        <p:blipFill>
-          <a:blip r:embed="rId4">
-            <a:extLst>
-              <a:ext uri="{28A0092B-C50C-407E-A947-70E740481C1C}">
-                <a14:useLocalDpi xmlns:a14="http://schemas.microsoft.com/office/drawing/2010/main" val="0"/>
-              </a:ext>
-            </a:extLst>
-          </a:blip>
-          <a:stretch>
-            <a:fillRect/>
-          </a:stretch>
-        </p:blipFill>
-        <p:spPr>
-          <a:xfrm>
-            <a:off x="7301355" y="4373267"/>
-            <a:ext cx="1849792" cy="2376271"/>
-          </a:xfrm>
-          <a:prstGeom prst="rect">
-            <a:avLst/>
-          </a:prstGeom>
-        </p:spPr>
-      </p:pic>
-      <p:sp>
-        <p:nvSpPr>
-          <p:cNvPr id="10" name="Foliennummernplatzhalter 9"/>
+            <a:pPr algn="ctr"/>
+            <a:r>
+              <a:rPr lang="de-DE" dirty="0" smtClean="0"/>
+              <a:t>REST-Service mit TCC</a:t>
+            </a:r>
+            <a:endParaRPr lang="de-DE" dirty="0"/>
+          </a:p>
+        </p:txBody>
+      </p:sp>
+      <p:sp>
+        <p:nvSpPr>
+          <p:cNvPr id="7" name="Foliennummernplatzhalter 6"/>
           <p:cNvSpPr>
             <a:spLocks noGrp="1"/>
           </p:cNvSpPr>
@@ -9383,10 +8899,616 @@
           </a:p>
         </p:txBody>
       </p:sp>
+      <p:sp>
+        <p:nvSpPr>
+          <p:cNvPr id="6" name="Textplatzhalter 2"/>
+          <p:cNvSpPr>
+            <a:spLocks noGrp="1"/>
+          </p:cNvSpPr>
+          <p:nvPr>
+            <p:ph type="body" idx="1"/>
+          </p:nvPr>
+        </p:nvSpPr>
+        <p:spPr>
+          <a:xfrm>
+            <a:off x="1817688" y="1016548"/>
+            <a:ext cx="4790282" cy="5777158"/>
+          </a:xfrm>
+        </p:spPr>
+        <p:txBody>
+          <a:bodyPr anchor="t">
+            <a:normAutofit/>
+          </a:bodyPr>
+          <a:lstStyle/>
+          <a:p>
+            <a:pPr>
+              <a:lnSpc>
+                <a:spcPct val="150000"/>
+              </a:lnSpc>
+              <a:buClrTx/>
+            </a:pPr>
+            <a:r>
+              <a:rPr lang="de-DE" sz="2500" b="1" dirty="0" smtClean="0">
+                <a:solidFill>
+                  <a:schemeClr val="tx1"/>
+                </a:solidFill>
+              </a:rPr>
+              <a:t>Vorteile</a:t>
+            </a:r>
+          </a:p>
+          <a:p>
+            <a:pPr marL="342900" indent="-342900">
+              <a:lnSpc>
+                <a:spcPct val="150000"/>
+              </a:lnSpc>
+              <a:buClrTx/>
+              <a:buFont typeface="Arial" panose="020B0604020202020204" pitchFamily="34" charset="0"/>
+              <a:buChar char="•"/>
+            </a:pPr>
+            <a:r>
+              <a:rPr lang="de-DE" sz="2000" dirty="0" smtClean="0">
+                <a:solidFill>
+                  <a:schemeClr val="tx1"/>
+                </a:solidFill>
+              </a:rPr>
+              <a:t>Gekapselter Kontext</a:t>
+            </a:r>
+          </a:p>
+          <a:p>
+            <a:pPr marL="342900" indent="-342900">
+              <a:lnSpc>
+                <a:spcPct val="150000"/>
+              </a:lnSpc>
+              <a:buClrTx/>
+              <a:buFont typeface="Arial" panose="020B0604020202020204" pitchFamily="34" charset="0"/>
+              <a:buChar char="•"/>
+            </a:pPr>
+            <a:r>
+              <a:rPr lang="de-DE" sz="2000" dirty="0" smtClean="0">
+                <a:solidFill>
+                  <a:schemeClr val="tx1"/>
+                </a:solidFill>
+              </a:rPr>
+              <a:t>Leichtgewichtige Client-API</a:t>
+            </a:r>
+          </a:p>
+          <a:p>
+            <a:pPr marL="342900" indent="-342900">
+              <a:lnSpc>
+                <a:spcPct val="150000"/>
+              </a:lnSpc>
+              <a:buClrTx/>
+              <a:buFont typeface="Arial" panose="020B0604020202020204" pitchFamily="34" charset="0"/>
+              <a:buChar char="•"/>
+            </a:pPr>
+            <a:r>
+              <a:rPr lang="de-DE" sz="2000" dirty="0" smtClean="0">
+                <a:solidFill>
+                  <a:schemeClr val="tx1"/>
+                </a:solidFill>
+              </a:rPr>
+              <a:t>Lose Kopplung </a:t>
+            </a:r>
+          </a:p>
+          <a:p>
+            <a:pPr marL="342900" indent="-342900">
+              <a:lnSpc>
+                <a:spcPct val="150000"/>
+              </a:lnSpc>
+              <a:buClrTx/>
+              <a:buFont typeface="Arial" panose="020B0604020202020204" pitchFamily="34" charset="0"/>
+              <a:buChar char="•"/>
+            </a:pPr>
+            <a:r>
+              <a:rPr lang="de-DE" sz="2000" dirty="0" smtClean="0">
+                <a:solidFill>
+                  <a:schemeClr val="tx1"/>
+                </a:solidFill>
+              </a:rPr>
+              <a:t>Wenig Abhängigkeiten</a:t>
+            </a:r>
+          </a:p>
+          <a:p>
+            <a:pPr marL="342900" indent="-342900">
+              <a:lnSpc>
+                <a:spcPct val="150000"/>
+              </a:lnSpc>
+              <a:buClrTx/>
+              <a:buFont typeface="Arial" panose="020B0604020202020204" pitchFamily="34" charset="0"/>
+              <a:buChar char="•"/>
+            </a:pPr>
+            <a:r>
+              <a:rPr lang="de-DE" sz="2000" dirty="0" smtClean="0">
+                <a:solidFill>
+                  <a:schemeClr val="tx1"/>
+                </a:solidFill>
+              </a:rPr>
+              <a:t>TCC für Transaktionen</a:t>
+            </a:r>
+          </a:p>
+          <a:p>
+            <a:pPr>
+              <a:lnSpc>
+                <a:spcPct val="150000"/>
+              </a:lnSpc>
+              <a:buClrTx/>
+            </a:pPr>
+            <a:endParaRPr lang="de-DE" sz="1500" dirty="0" smtClean="0">
+              <a:solidFill>
+                <a:schemeClr val="tx1"/>
+              </a:solidFill>
+            </a:endParaRPr>
+          </a:p>
+          <a:p>
+            <a:pPr marL="342900" indent="-342900">
+              <a:lnSpc>
+                <a:spcPct val="150000"/>
+              </a:lnSpc>
+              <a:buClrTx/>
+              <a:buFont typeface="Arial" panose="020B0604020202020204" pitchFamily="34" charset="0"/>
+              <a:buChar char="•"/>
+            </a:pPr>
+            <a:endParaRPr lang="de-DE" sz="1500" dirty="0" smtClean="0">
+              <a:solidFill>
+                <a:schemeClr val="tx1"/>
+              </a:solidFill>
+            </a:endParaRPr>
+          </a:p>
+          <a:p>
+            <a:pPr marL="342900" indent="-342900">
+              <a:lnSpc>
+                <a:spcPct val="150000"/>
+              </a:lnSpc>
+              <a:buClrTx/>
+              <a:buFont typeface="Arial" panose="020B0604020202020204" pitchFamily="34" charset="0"/>
+              <a:buChar char="•"/>
+            </a:pPr>
+            <a:endParaRPr lang="de-DE" sz="1500" dirty="0" smtClean="0">
+              <a:solidFill>
+                <a:schemeClr val="tx1"/>
+              </a:solidFill>
+            </a:endParaRPr>
+          </a:p>
+          <a:p>
+            <a:pPr marL="342900" indent="-342900">
+              <a:buClrTx/>
+              <a:buFont typeface="Arial" panose="020B0604020202020204" pitchFamily="34" charset="0"/>
+              <a:buChar char="•"/>
+            </a:pPr>
+            <a:endParaRPr lang="de-DE" sz="1500" dirty="0" smtClean="0">
+              <a:solidFill>
+                <a:schemeClr val="tx1"/>
+              </a:solidFill>
+            </a:endParaRPr>
+          </a:p>
+          <a:p>
+            <a:pPr marL="342900" indent="-342900">
+              <a:lnSpc>
+                <a:spcPct val="200000"/>
+              </a:lnSpc>
+              <a:buClrTx/>
+              <a:buFont typeface="Arial" panose="020B0604020202020204" pitchFamily="34" charset="0"/>
+              <a:buChar char="•"/>
+            </a:pPr>
+            <a:endParaRPr lang="de-DE" sz="1500" dirty="0">
+              <a:solidFill>
+                <a:schemeClr val="tx1"/>
+              </a:solidFill>
+            </a:endParaRPr>
+          </a:p>
+        </p:txBody>
+      </p:sp>
+      <p:sp>
+        <p:nvSpPr>
+          <p:cNvPr id="8" name="Textplatzhalter 2"/>
+          <p:cNvSpPr txBox="1">
+            <a:spLocks/>
+          </p:cNvSpPr>
+          <p:nvPr/>
+        </p:nvSpPr>
+        <p:spPr>
+          <a:xfrm>
+            <a:off x="6687343" y="1016548"/>
+            <a:ext cx="5504657" cy="5777158"/>
+          </a:xfrm>
+          <a:prstGeom prst="rect">
+            <a:avLst/>
+          </a:prstGeom>
+        </p:spPr>
+        <p:txBody>
+          <a:bodyPr vert="horz" lIns="91440" tIns="45720" rIns="91440" bIns="45720" rtlCol="0" anchor="t">
+            <a:normAutofit/>
+          </a:bodyPr>
+          <a:lstStyle>
+            <a:lvl1pPr marL="0" indent="0" algn="l" defTabSz="457200" rtl="0" eaLnBrk="1" latinLnBrk="0" hangingPunct="1">
+              <a:spcBef>
+                <a:spcPts val="1000"/>
+              </a:spcBef>
+              <a:spcAft>
+                <a:spcPts val="0"/>
+              </a:spcAft>
+              <a:buClr>
+                <a:schemeClr val="accent1"/>
+              </a:buClr>
+              <a:buFont typeface="Wingdings 3" charset="2"/>
+              <a:buNone/>
+              <a:defRPr sz="1800" kern="1200">
+                <a:solidFill>
+                  <a:schemeClr val="tx1">
+                    <a:lumMod val="65000"/>
+                    <a:lumOff val="35000"/>
+                  </a:schemeClr>
+                </a:solidFill>
+                <a:latin typeface="+mn-lt"/>
+                <a:ea typeface="+mn-ea"/>
+                <a:cs typeface="+mn-cs"/>
+              </a:defRPr>
+            </a:lvl1pPr>
+            <a:lvl2pPr marL="457200" indent="0" algn="l" defTabSz="457200" rtl="0" eaLnBrk="1" latinLnBrk="0" hangingPunct="1">
+              <a:spcBef>
+                <a:spcPts val="1000"/>
+              </a:spcBef>
+              <a:spcAft>
+                <a:spcPts val="0"/>
+              </a:spcAft>
+              <a:buClr>
+                <a:schemeClr val="accent1"/>
+              </a:buClr>
+              <a:buFont typeface="Wingdings 3" charset="2"/>
+              <a:buNone/>
+              <a:defRPr sz="1800" kern="1200">
+                <a:solidFill>
+                  <a:schemeClr val="tx1">
+                    <a:tint val="75000"/>
+                  </a:schemeClr>
+                </a:solidFill>
+                <a:latin typeface="+mn-lt"/>
+                <a:ea typeface="+mn-ea"/>
+                <a:cs typeface="+mn-cs"/>
+              </a:defRPr>
+            </a:lvl2pPr>
+            <a:lvl3pPr marL="914400" indent="0" algn="l" defTabSz="457200" rtl="0" eaLnBrk="1" latinLnBrk="0" hangingPunct="1">
+              <a:spcBef>
+                <a:spcPts val="1000"/>
+              </a:spcBef>
+              <a:spcAft>
+                <a:spcPts val="0"/>
+              </a:spcAft>
+              <a:buClr>
+                <a:schemeClr val="accent1"/>
+              </a:buClr>
+              <a:buFont typeface="Wingdings 3" charset="2"/>
+              <a:buNone/>
+              <a:defRPr sz="1600" kern="1200">
+                <a:solidFill>
+                  <a:schemeClr val="tx1">
+                    <a:tint val="75000"/>
+                  </a:schemeClr>
+                </a:solidFill>
+                <a:latin typeface="+mn-lt"/>
+                <a:ea typeface="+mn-ea"/>
+                <a:cs typeface="+mn-cs"/>
+              </a:defRPr>
+            </a:lvl3pPr>
+            <a:lvl4pPr marL="1371600" indent="0" algn="l" defTabSz="457200" rtl="0" eaLnBrk="1" latinLnBrk="0" hangingPunct="1">
+              <a:spcBef>
+                <a:spcPts val="1000"/>
+              </a:spcBef>
+              <a:spcAft>
+                <a:spcPts val="0"/>
+              </a:spcAft>
+              <a:buClr>
+                <a:schemeClr val="accent1"/>
+              </a:buClr>
+              <a:buFont typeface="Wingdings 3" charset="2"/>
+              <a:buNone/>
+              <a:defRPr sz="1400" kern="1200">
+                <a:solidFill>
+                  <a:schemeClr val="tx1">
+                    <a:tint val="75000"/>
+                  </a:schemeClr>
+                </a:solidFill>
+                <a:latin typeface="+mn-lt"/>
+                <a:ea typeface="+mn-ea"/>
+                <a:cs typeface="+mn-cs"/>
+              </a:defRPr>
+            </a:lvl4pPr>
+            <a:lvl5pPr marL="1828800" indent="0" algn="l" defTabSz="457200" rtl="0" eaLnBrk="1" latinLnBrk="0" hangingPunct="1">
+              <a:spcBef>
+                <a:spcPts val="1000"/>
+              </a:spcBef>
+              <a:spcAft>
+                <a:spcPts val="0"/>
+              </a:spcAft>
+              <a:buClr>
+                <a:schemeClr val="accent1"/>
+              </a:buClr>
+              <a:buFont typeface="Wingdings 3" charset="2"/>
+              <a:buNone/>
+              <a:defRPr sz="1400" kern="1200">
+                <a:solidFill>
+                  <a:schemeClr val="tx1">
+                    <a:tint val="75000"/>
+                  </a:schemeClr>
+                </a:solidFill>
+                <a:latin typeface="+mn-lt"/>
+                <a:ea typeface="+mn-ea"/>
+                <a:cs typeface="+mn-cs"/>
+              </a:defRPr>
+            </a:lvl5pPr>
+            <a:lvl6pPr marL="2286000" indent="0" algn="l" defTabSz="457200" rtl="0" eaLnBrk="1" latinLnBrk="0" hangingPunct="1">
+              <a:spcBef>
+                <a:spcPts val="1000"/>
+              </a:spcBef>
+              <a:spcAft>
+                <a:spcPts val="0"/>
+              </a:spcAft>
+              <a:buClr>
+                <a:schemeClr val="accent1"/>
+              </a:buClr>
+              <a:buFont typeface="Wingdings 3" charset="2"/>
+              <a:buNone/>
+              <a:defRPr sz="1400" kern="1200">
+                <a:solidFill>
+                  <a:schemeClr val="tx1">
+                    <a:tint val="75000"/>
+                  </a:schemeClr>
+                </a:solidFill>
+                <a:latin typeface="+mn-lt"/>
+                <a:ea typeface="+mn-ea"/>
+                <a:cs typeface="+mn-cs"/>
+              </a:defRPr>
+            </a:lvl6pPr>
+            <a:lvl7pPr marL="2743200" indent="0" algn="l" defTabSz="457200" rtl="0" eaLnBrk="1" latinLnBrk="0" hangingPunct="1">
+              <a:spcBef>
+                <a:spcPts val="1000"/>
+              </a:spcBef>
+              <a:spcAft>
+                <a:spcPts val="0"/>
+              </a:spcAft>
+              <a:buClr>
+                <a:schemeClr val="accent1"/>
+              </a:buClr>
+              <a:buFont typeface="Wingdings 3" charset="2"/>
+              <a:buNone/>
+              <a:defRPr sz="1400" kern="1200">
+                <a:solidFill>
+                  <a:schemeClr val="tx1">
+                    <a:tint val="75000"/>
+                  </a:schemeClr>
+                </a:solidFill>
+                <a:latin typeface="+mn-lt"/>
+                <a:ea typeface="+mn-ea"/>
+                <a:cs typeface="+mn-cs"/>
+              </a:defRPr>
+            </a:lvl7pPr>
+            <a:lvl8pPr marL="3200400" indent="0" algn="l" defTabSz="457200" rtl="0" eaLnBrk="1" latinLnBrk="0" hangingPunct="1">
+              <a:spcBef>
+                <a:spcPts val="1000"/>
+              </a:spcBef>
+              <a:spcAft>
+                <a:spcPts val="0"/>
+              </a:spcAft>
+              <a:buClr>
+                <a:schemeClr val="accent1"/>
+              </a:buClr>
+              <a:buFont typeface="Wingdings 3" charset="2"/>
+              <a:buNone/>
+              <a:defRPr sz="1400" kern="1200">
+                <a:solidFill>
+                  <a:schemeClr val="tx1">
+                    <a:tint val="75000"/>
+                  </a:schemeClr>
+                </a:solidFill>
+                <a:latin typeface="+mn-lt"/>
+                <a:ea typeface="+mn-ea"/>
+                <a:cs typeface="+mn-cs"/>
+              </a:defRPr>
+            </a:lvl8pPr>
+            <a:lvl9pPr marL="3657600" indent="0" algn="l" defTabSz="457200" rtl="0" eaLnBrk="1" latinLnBrk="0" hangingPunct="1">
+              <a:spcBef>
+                <a:spcPts val="1000"/>
+              </a:spcBef>
+              <a:spcAft>
+                <a:spcPts val="0"/>
+              </a:spcAft>
+              <a:buClr>
+                <a:schemeClr val="accent1"/>
+              </a:buClr>
+              <a:buFont typeface="Wingdings 3" charset="2"/>
+              <a:buNone/>
+              <a:defRPr sz="1400" kern="1200">
+                <a:solidFill>
+                  <a:schemeClr val="tx1">
+                    <a:tint val="75000"/>
+                  </a:schemeClr>
+                </a:solidFill>
+                <a:latin typeface="+mn-lt"/>
+                <a:ea typeface="+mn-ea"/>
+                <a:cs typeface="+mn-cs"/>
+              </a:defRPr>
+            </a:lvl9pPr>
+          </a:lstStyle>
+          <a:p>
+            <a:pPr>
+              <a:lnSpc>
+                <a:spcPct val="150000"/>
+              </a:lnSpc>
+              <a:buClrTx/>
+            </a:pPr>
+            <a:r>
+              <a:rPr lang="de-DE" sz="2500" b="1" dirty="0" smtClean="0">
+                <a:solidFill>
+                  <a:schemeClr val="tx1"/>
+                </a:solidFill>
+              </a:rPr>
+              <a:t>Nachteile</a:t>
+            </a:r>
+          </a:p>
+          <a:p>
+            <a:pPr marL="342900" indent="-342900">
+              <a:lnSpc>
+                <a:spcPct val="150000"/>
+              </a:lnSpc>
+              <a:buClrTx/>
+              <a:buFont typeface="Arial" panose="020B0604020202020204" pitchFamily="34" charset="0"/>
+              <a:buChar char="•"/>
+            </a:pPr>
+            <a:r>
+              <a:rPr lang="de-DE" sz="2000" dirty="0" smtClean="0">
+                <a:solidFill>
+                  <a:schemeClr val="tx1"/>
+                </a:solidFill>
+              </a:rPr>
+              <a:t>Keine gemeinsame Transaktion</a:t>
+            </a:r>
+          </a:p>
+          <a:p>
+            <a:pPr marL="342900" indent="-342900">
+              <a:lnSpc>
+                <a:spcPct val="150000"/>
+              </a:lnSpc>
+              <a:buClrTx/>
+              <a:buFont typeface="Arial" panose="020B0604020202020204" pitchFamily="34" charset="0"/>
+              <a:buChar char="•"/>
+            </a:pPr>
+            <a:r>
+              <a:rPr lang="de-DE" sz="2000" dirty="0" smtClean="0">
+                <a:solidFill>
+                  <a:schemeClr val="tx1"/>
+                </a:solidFill>
+              </a:rPr>
+              <a:t>Gefahr von </a:t>
+            </a:r>
+            <a:r>
+              <a:rPr lang="de-DE" sz="2000" dirty="0" err="1" smtClean="0">
+                <a:solidFill>
+                  <a:schemeClr val="tx1"/>
+                </a:solidFill>
+              </a:rPr>
+              <a:t>Heuristic</a:t>
+            </a:r>
+            <a:r>
+              <a:rPr lang="de-DE" sz="2000" dirty="0" smtClean="0">
+                <a:solidFill>
+                  <a:schemeClr val="tx1"/>
+                </a:solidFill>
+              </a:rPr>
+              <a:t> </a:t>
+            </a:r>
+            <a:r>
+              <a:rPr lang="de-DE" sz="2000" dirty="0" err="1" smtClean="0">
+                <a:solidFill>
+                  <a:schemeClr val="tx1"/>
+                </a:solidFill>
+              </a:rPr>
+              <a:t>Exceptions</a:t>
+            </a:r>
+            <a:endParaRPr lang="de-DE" sz="2000" dirty="0" smtClean="0">
+              <a:solidFill>
+                <a:schemeClr val="tx1"/>
+              </a:solidFill>
+            </a:endParaRPr>
+          </a:p>
+          <a:p>
+            <a:pPr marL="342900" indent="-342900">
+              <a:lnSpc>
+                <a:spcPct val="150000"/>
+              </a:lnSpc>
+              <a:buClrTx/>
+              <a:buFont typeface="Arial" panose="020B0604020202020204" pitchFamily="34" charset="0"/>
+              <a:buChar char="•"/>
+            </a:pPr>
+            <a:r>
+              <a:rPr lang="de-DE" sz="2000" dirty="0" smtClean="0">
+                <a:solidFill>
+                  <a:schemeClr val="tx1"/>
+                </a:solidFill>
+              </a:rPr>
+              <a:t>Service nicht verfügbar</a:t>
+            </a:r>
+          </a:p>
+          <a:p>
+            <a:pPr marL="342900" indent="-342900">
+              <a:lnSpc>
+                <a:spcPct val="150000"/>
+              </a:lnSpc>
+              <a:buClrTx/>
+              <a:buFont typeface="Arial" panose="020B0604020202020204" pitchFamily="34" charset="0"/>
+              <a:buChar char="•"/>
+            </a:pPr>
+            <a:r>
+              <a:rPr lang="de-DE" sz="2000" dirty="0" smtClean="0">
+                <a:solidFill>
+                  <a:schemeClr val="tx1"/>
+                </a:solidFill>
+              </a:rPr>
+              <a:t>Transaktions-Koordinator nötig</a:t>
+            </a:r>
+          </a:p>
+          <a:p>
+            <a:pPr marL="342900" indent="-342900">
+              <a:lnSpc>
+                <a:spcPct val="150000"/>
+              </a:lnSpc>
+              <a:buClrTx/>
+              <a:buFont typeface="Arial" panose="020B0604020202020204" pitchFamily="34" charset="0"/>
+              <a:buChar char="•"/>
+            </a:pPr>
+            <a:endParaRPr lang="de-DE" dirty="0" smtClean="0">
+              <a:solidFill>
+                <a:schemeClr val="tx1"/>
+              </a:solidFill>
+            </a:endParaRPr>
+          </a:p>
+          <a:p>
+            <a:pPr marL="342900" indent="-342900">
+              <a:lnSpc>
+                <a:spcPct val="150000"/>
+              </a:lnSpc>
+              <a:buClrTx/>
+              <a:buFont typeface="Arial" panose="020B0604020202020204" pitchFamily="34" charset="0"/>
+              <a:buChar char="•"/>
+            </a:pPr>
+            <a:endParaRPr lang="de-DE" sz="1500" dirty="0" smtClean="0">
+              <a:solidFill>
+                <a:schemeClr val="tx1"/>
+              </a:solidFill>
+            </a:endParaRPr>
+          </a:p>
+          <a:p>
+            <a:pPr marL="342900" indent="-342900">
+              <a:buClrTx/>
+              <a:buFont typeface="Arial" panose="020B0604020202020204" pitchFamily="34" charset="0"/>
+              <a:buChar char="•"/>
+            </a:pPr>
+            <a:endParaRPr lang="de-DE" sz="1500" dirty="0" smtClean="0">
+              <a:solidFill>
+                <a:schemeClr val="tx1"/>
+              </a:solidFill>
+            </a:endParaRPr>
+          </a:p>
+          <a:p>
+            <a:pPr marL="342900" indent="-342900">
+              <a:lnSpc>
+                <a:spcPct val="200000"/>
+              </a:lnSpc>
+              <a:buClrTx/>
+              <a:buFont typeface="Arial" panose="020B0604020202020204" pitchFamily="34" charset="0"/>
+              <a:buChar char="•"/>
+            </a:pPr>
+            <a:endParaRPr lang="de-DE" sz="1500" dirty="0">
+              <a:solidFill>
+                <a:schemeClr val="tx1"/>
+              </a:solidFill>
+            </a:endParaRPr>
+          </a:p>
+        </p:txBody>
+      </p:sp>
     </p:spTree>
     <p:extLst>
       <p:ext uri="{BB962C8B-B14F-4D97-AF65-F5344CB8AC3E}">
-        <p14:creationId xmlns:p14="http://schemas.microsoft.com/office/powerpoint/2010/main" val="4169446816"/>
+        <p14:creationId xmlns:p14="http://schemas.microsoft.com/office/powerpoint/2010/main" val="3447384900"/>
       </p:ext>
     </p:extLst>
   </p:cSld>
@@ -9425,8 +9547,8 @@
         </p:nvSpPr>
         <p:spPr>
           <a:xfrm>
-            <a:off x="2589212" y="271461"/>
-            <a:ext cx="8915399" cy="866474"/>
+            <a:off x="0" y="10708"/>
+            <a:ext cx="12192000" cy="1005840"/>
           </a:xfrm>
         </p:spPr>
         <p:txBody>
@@ -9435,13 +9557,10 @@
           </a:bodyPr>
           <a:lstStyle/>
           <a:p>
-            <a:r>
-              <a:rPr lang="de-DE" dirty="0" err="1" smtClean="0"/>
-              <a:t>CCMail</a:t>
-            </a:r>
+            <a:pPr algn="ctr"/>
             <a:r>
               <a:rPr lang="de-DE" dirty="0" smtClean="0"/>
-              <a:t> Aufbau</a:t>
+              <a:t>Transaktional EJB (DAO)</a:t>
             </a:r>
             <a:endParaRPr lang="de-DE" dirty="0"/>
           </a:p>
@@ -9449,161 +9568,31 @@
       </p:sp>
       <p:sp>
         <p:nvSpPr>
-          <p:cNvPr id="6" name="Textplatzhalter 8"/>
-          <p:cNvSpPr>
-            <a:spLocks noGrp="1"/>
-          </p:cNvSpPr>
-          <p:nvPr>
-            <p:ph type="body" idx="1"/>
-          </p:nvPr>
-        </p:nvSpPr>
-        <p:spPr>
-          <a:xfrm>
-            <a:off x="2589212" y="1670400"/>
-            <a:ext cx="4351588" cy="5047200"/>
-          </a:xfrm>
-        </p:spPr>
-        <p:txBody>
-          <a:bodyPr anchor="t">
-            <a:normAutofit/>
-          </a:bodyPr>
+          <p:cNvPr id="7" name="Foliennummernplatzhalter 6"/>
+          <p:cNvSpPr>
+            <a:spLocks noGrp="1"/>
+          </p:cNvSpPr>
+          <p:nvPr>
+            <p:ph type="sldNum" sz="quarter" idx="12"/>
+          </p:nvPr>
+        </p:nvSpPr>
+        <p:spPr/>
+        <p:txBody>
+          <a:bodyPr/>
           <a:lstStyle/>
           <a:p>
-            <a:pPr marL="457200" indent="-457200">
-              <a:lnSpc>
-                <a:spcPct val="110000"/>
-              </a:lnSpc>
-              <a:buClr>
-                <a:schemeClr val="tx1"/>
-              </a:buClr>
-              <a:buFont typeface="Arial" panose="020B0604020202020204" pitchFamily="34" charset="0"/>
-              <a:buChar char="•"/>
-            </a:pPr>
-            <a:r>
-              <a:rPr lang="de-DE" sz="2500" dirty="0" smtClean="0">
-                <a:solidFill>
-                  <a:schemeClr val="tx1"/>
-                </a:solidFill>
-              </a:rPr>
-              <a:t>Datenbank </a:t>
-            </a:r>
-            <a:br>
-              <a:rPr lang="de-DE" sz="2500" dirty="0" smtClean="0">
-                <a:solidFill>
-                  <a:schemeClr val="tx1"/>
-                </a:solidFill>
-              </a:rPr>
-            </a:br>
-            <a:r>
-              <a:rPr lang="de-DE" sz="2500" dirty="0" smtClean="0">
-                <a:solidFill>
-                  <a:schemeClr val="tx1"/>
-                </a:solidFill>
-              </a:rPr>
-              <a:t>(Schnittstelle)</a:t>
-            </a:r>
-          </a:p>
-          <a:p>
-            <a:pPr marL="457200" indent="-457200">
-              <a:lnSpc>
-                <a:spcPct val="110000"/>
-              </a:lnSpc>
-              <a:buClr>
-                <a:schemeClr val="tx1"/>
-              </a:buClr>
-              <a:buFont typeface="Arial" panose="020B0604020202020204" pitchFamily="34" charset="0"/>
-              <a:buChar char="•"/>
-            </a:pPr>
-            <a:r>
-              <a:rPr lang="de-DE" sz="2500" dirty="0" smtClean="0">
-                <a:solidFill>
-                  <a:schemeClr val="tx1"/>
-                </a:solidFill>
-              </a:rPr>
-              <a:t>DAO</a:t>
-            </a:r>
-            <a:br>
-              <a:rPr lang="de-DE" sz="2500" dirty="0" smtClean="0">
-                <a:solidFill>
-                  <a:schemeClr val="tx1"/>
-                </a:solidFill>
-              </a:rPr>
-            </a:br>
-            <a:r>
-              <a:rPr lang="de-DE" sz="2500" dirty="0">
-                <a:solidFill>
-                  <a:schemeClr val="tx1"/>
-                </a:solidFill>
-              </a:rPr>
-              <a:t>(Datenzugriff)</a:t>
-            </a:r>
-          </a:p>
-          <a:p>
-            <a:pPr marL="457200" indent="-457200">
-              <a:lnSpc>
-                <a:spcPct val="110000"/>
-              </a:lnSpc>
-              <a:buClr>
-                <a:schemeClr val="tx1"/>
-              </a:buClr>
-              <a:buFont typeface="Arial" panose="020B0604020202020204" pitchFamily="34" charset="0"/>
-              <a:buChar char="•"/>
-            </a:pPr>
-            <a:r>
-              <a:rPr lang="de-DE" sz="2500" dirty="0" err="1" smtClean="0">
-                <a:solidFill>
-                  <a:schemeClr val="tx1"/>
-                </a:solidFill>
-              </a:rPr>
-              <a:t>CCMail</a:t>
-            </a:r>
-            <a:r>
-              <a:rPr lang="de-DE" sz="2500" dirty="0">
-                <a:solidFill>
-                  <a:schemeClr val="tx1"/>
-                </a:solidFill>
-              </a:rPr>
-              <a:t/>
-            </a:r>
-            <a:br>
-              <a:rPr lang="de-DE" sz="2500" dirty="0">
-                <a:solidFill>
-                  <a:schemeClr val="tx1"/>
-                </a:solidFill>
-              </a:rPr>
-            </a:br>
-            <a:r>
-              <a:rPr lang="de-DE" sz="2500" dirty="0" smtClean="0">
-                <a:solidFill>
-                  <a:schemeClr val="tx1"/>
-                </a:solidFill>
-              </a:rPr>
-              <a:t>(Konsolenanwendung)</a:t>
-            </a:r>
-          </a:p>
-          <a:p>
-            <a:pPr>
-              <a:lnSpc>
-                <a:spcPct val="110000"/>
-              </a:lnSpc>
-            </a:pPr>
-            <a:endParaRPr lang="de-DE" sz="2500" dirty="0" smtClean="0"/>
-          </a:p>
-          <a:p>
-            <a:pPr marL="457200" indent="-457200">
-              <a:lnSpc>
-                <a:spcPct val="110000"/>
-              </a:lnSpc>
-              <a:buFont typeface="Arial" panose="020B0604020202020204" pitchFamily="34" charset="0"/>
-              <a:buChar char="•"/>
-            </a:pPr>
-            <a:endParaRPr lang="de-DE" sz="2500" dirty="0"/>
+            <a:fld id="{D57F1E4F-1CFF-5643-939E-217C01CDF565}" type="slidenum">
+              <a:rPr lang="en-US" b="1" smtClean="0"/>
+              <a:pPr/>
+              <a:t>5</a:t>
+            </a:fld>
+            <a:endParaRPr lang="en-US" b="1" dirty="0"/>
           </a:p>
         </p:txBody>
       </p:sp>
       <p:pic>
         <p:nvPicPr>
-          <p:cNvPr id="3" name="Grafik 2"/>
+          <p:cNvPr id="4" name="Grafik 3"/>
           <p:cNvPicPr>
             <a:picLocks noChangeAspect="1"/>
           </p:cNvPicPr>
@@ -9617,42 +9606,18 @@
         </p:blipFill>
         <p:spPr>
           <a:xfrm>
-            <a:off x="6810903" y="1670400"/>
-            <a:ext cx="5249793" cy="4734225"/>
+            <a:off x="2089943" y="1302298"/>
+            <a:ext cx="9753927" cy="4927052"/>
           </a:xfrm>
           <a:prstGeom prst="rect">
             <a:avLst/>
           </a:prstGeom>
         </p:spPr>
       </p:pic>
-      <p:sp>
-        <p:nvSpPr>
-          <p:cNvPr id="8" name="Foliennummernplatzhalter 7"/>
-          <p:cNvSpPr>
-            <a:spLocks noGrp="1"/>
-          </p:cNvSpPr>
-          <p:nvPr>
-            <p:ph type="sldNum" sz="quarter" idx="12"/>
-          </p:nvPr>
-        </p:nvSpPr>
-        <p:spPr/>
-        <p:txBody>
-          <a:bodyPr/>
-          <a:lstStyle/>
-          <a:p>
-            <a:fld id="{D57F1E4F-1CFF-5643-939E-217C01CDF565}" type="slidenum">
-              <a:rPr lang="en-US" b="1" smtClean="0"/>
-              <a:pPr/>
-              <a:t>5</a:t>
-            </a:fld>
-            <a:endParaRPr lang="en-US" b="1" dirty="0"/>
-          </a:p>
-        </p:txBody>
-      </p:sp>
     </p:spTree>
     <p:extLst>
       <p:ext uri="{BB962C8B-B14F-4D97-AF65-F5344CB8AC3E}">
-        <p14:creationId xmlns:p14="http://schemas.microsoft.com/office/powerpoint/2010/main" val="112697452"/>
+        <p14:creationId xmlns:p14="http://schemas.microsoft.com/office/powerpoint/2010/main" val="1962121898"/>
       </p:ext>
     </p:extLst>
   </p:cSld>
@@ -9691,8 +9656,8 @@
         </p:nvSpPr>
         <p:spPr>
           <a:xfrm>
-            <a:off x="2589212" y="196560"/>
-            <a:ext cx="8915399" cy="1005840"/>
+            <a:off x="0" y="10708"/>
+            <a:ext cx="12192000" cy="1005840"/>
           </a:xfrm>
         </p:spPr>
         <p:txBody>
@@ -9701,13 +9666,10 @@
           </a:bodyPr>
           <a:lstStyle/>
           <a:p>
-            <a:r>
-              <a:rPr lang="de-DE" dirty="0" err="1" smtClean="0"/>
-              <a:t>CCMail</a:t>
-            </a:r>
-            <a:r>
-              <a:rPr lang="de-DE" dirty="0" smtClean="0"/>
-              <a:t> Probleme</a:t>
+            <a:pPr algn="ctr"/>
+            <a:r>
+              <a:rPr lang="de-DE" dirty="0"/>
+              <a:t>Transaktional EJB (DAO)</a:t>
             </a:r>
             <a:endParaRPr lang="de-DE" dirty="0"/>
           </a:p>
@@ -9715,249 +9677,7 @@
       </p:sp>
       <p:sp>
         <p:nvSpPr>
-          <p:cNvPr id="6" name="Textplatzhalter 8"/>
-          <p:cNvSpPr>
-            <a:spLocks noGrp="1"/>
-          </p:cNvSpPr>
-          <p:nvPr>
-            <p:ph type="body" idx="1"/>
-          </p:nvPr>
-        </p:nvSpPr>
-        <p:spPr>
-          <a:xfrm>
-            <a:off x="2589212" y="1670400"/>
-            <a:ext cx="9413188" cy="5047200"/>
-          </a:xfrm>
-        </p:spPr>
-        <p:txBody>
-          <a:bodyPr anchor="t">
-            <a:normAutofit/>
-          </a:bodyPr>
-          <a:lstStyle/>
-          <a:p>
-            <a:pPr marL="457200" indent="-457200">
-              <a:lnSpc>
-                <a:spcPct val="110000"/>
-              </a:lnSpc>
-              <a:buClr>
-                <a:schemeClr val="tx1"/>
-              </a:buClr>
-              <a:buFont typeface="Arial" panose="020B0604020202020204" pitchFamily="34" charset="0"/>
-              <a:buChar char="•"/>
-            </a:pPr>
-            <a:r>
-              <a:rPr lang="de-DE" sz="2500" dirty="0" smtClean="0">
-                <a:solidFill>
-                  <a:schemeClr val="tx1"/>
-                </a:solidFill>
-              </a:rPr>
-              <a:t>Java 1.4 </a:t>
-            </a:r>
-          </a:p>
-          <a:p>
-            <a:pPr marL="457200" indent="-457200">
-              <a:lnSpc>
-                <a:spcPct val="110000"/>
-              </a:lnSpc>
-              <a:buClr>
-                <a:schemeClr val="tx1"/>
-              </a:buClr>
-              <a:buFont typeface="Arial" panose="020B0604020202020204" pitchFamily="34" charset="0"/>
-              <a:buChar char="•"/>
-            </a:pPr>
-            <a:r>
-              <a:rPr lang="de-DE" sz="2500" dirty="0" smtClean="0">
-                <a:solidFill>
-                  <a:schemeClr val="tx1"/>
-                </a:solidFill>
-              </a:rPr>
-              <a:t>Gewachsen nicht </a:t>
-            </a:r>
-            <a:r>
-              <a:rPr lang="de-DE" sz="2500" dirty="0" err="1" smtClean="0">
-                <a:solidFill>
-                  <a:schemeClr val="tx1"/>
-                </a:solidFill>
-              </a:rPr>
-              <a:t>evolutioniert</a:t>
-            </a:r>
-            <a:endParaRPr lang="de-DE" sz="2500" dirty="0">
-              <a:solidFill>
-                <a:schemeClr val="tx1"/>
-              </a:solidFill>
-            </a:endParaRPr>
-          </a:p>
-          <a:p>
-            <a:pPr marL="457200" indent="-457200">
-              <a:lnSpc>
-                <a:spcPct val="110000"/>
-              </a:lnSpc>
-              <a:buClr>
-                <a:schemeClr val="tx1"/>
-              </a:buClr>
-              <a:buFont typeface="Arial" panose="020B0604020202020204" pitchFamily="34" charset="0"/>
-              <a:buChar char="•"/>
-            </a:pPr>
-            <a:r>
-              <a:rPr lang="de-DE" sz="2500" dirty="0" smtClean="0">
-                <a:solidFill>
-                  <a:schemeClr val="tx1"/>
-                </a:solidFill>
-              </a:rPr>
-              <a:t>Nicht mehr erweiterbar</a:t>
-            </a:r>
-          </a:p>
-          <a:p>
-            <a:pPr marL="457200" indent="-457200">
-              <a:lnSpc>
-                <a:spcPct val="110000"/>
-              </a:lnSpc>
-              <a:buClr>
-                <a:schemeClr val="tx1"/>
-              </a:buClr>
-              <a:buFont typeface="Arial" panose="020B0604020202020204" pitchFamily="34" charset="0"/>
-              <a:buChar char="•"/>
-            </a:pPr>
-            <a:r>
-              <a:rPr lang="de-DE" sz="2500" dirty="0" smtClean="0">
-                <a:solidFill>
-                  <a:schemeClr val="tx1"/>
-                </a:solidFill>
-              </a:rPr>
-              <a:t>Starre Klassenhierarchien </a:t>
-            </a:r>
-          </a:p>
-          <a:p>
-            <a:pPr marL="457200" indent="-457200">
-              <a:lnSpc>
-                <a:spcPct val="110000"/>
-              </a:lnSpc>
-              <a:buClr>
-                <a:schemeClr val="tx1"/>
-              </a:buClr>
-              <a:buFont typeface="Arial" panose="020B0604020202020204" pitchFamily="34" charset="0"/>
-              <a:buChar char="•"/>
-            </a:pPr>
-            <a:r>
-              <a:rPr lang="de-DE" sz="2500" dirty="0" smtClean="0">
-                <a:solidFill>
-                  <a:schemeClr val="tx1"/>
-                </a:solidFill>
-              </a:rPr>
-              <a:t>Keine Modularisierung </a:t>
-            </a:r>
-          </a:p>
-          <a:p>
-            <a:pPr marL="457200" indent="-457200">
-              <a:lnSpc>
-                <a:spcPct val="110000"/>
-              </a:lnSpc>
-              <a:buClr>
-                <a:schemeClr val="tx1"/>
-              </a:buClr>
-              <a:buFont typeface="Arial" panose="020B0604020202020204" pitchFamily="34" charset="0"/>
-              <a:buChar char="•"/>
-            </a:pPr>
-            <a:r>
-              <a:rPr lang="de-DE" sz="2500" dirty="0" smtClean="0">
-                <a:solidFill>
-                  <a:schemeClr val="tx1"/>
-                </a:solidFill>
-              </a:rPr>
-              <a:t>E-Mails nicht rekonstruierbar</a:t>
-            </a:r>
-          </a:p>
-          <a:p>
-            <a:pPr marL="457200" indent="-457200">
-              <a:lnSpc>
-                <a:spcPct val="110000"/>
-              </a:lnSpc>
-              <a:buClr>
-                <a:schemeClr val="tx1"/>
-              </a:buClr>
-              <a:buFont typeface="Arial" panose="020B0604020202020204" pitchFamily="34" charset="0"/>
-              <a:buChar char="•"/>
-            </a:pPr>
-            <a:r>
-              <a:rPr lang="de-DE" sz="2500" dirty="0" smtClean="0">
-                <a:solidFill>
-                  <a:schemeClr val="tx1"/>
-                </a:solidFill>
-              </a:rPr>
-              <a:t>Keine benutzerdefinierten </a:t>
-            </a:r>
-            <a:r>
-              <a:rPr lang="de-DE" sz="2500" dirty="0">
-                <a:solidFill>
-                  <a:schemeClr val="tx1"/>
-                </a:solidFill>
-              </a:rPr>
-              <a:t>E-Mail-Vorlagen</a:t>
-            </a:r>
-          </a:p>
-          <a:p>
-            <a:pPr marL="457200" indent="-457200">
-              <a:lnSpc>
-                <a:spcPct val="110000"/>
-              </a:lnSpc>
-              <a:buClr>
-                <a:schemeClr val="tx1"/>
-              </a:buClr>
-              <a:buFont typeface="Arial" panose="020B0604020202020204" pitchFamily="34" charset="0"/>
-              <a:buChar char="•"/>
-            </a:pPr>
-            <a:r>
-              <a:rPr lang="de-DE" sz="2500" dirty="0">
-                <a:solidFill>
-                  <a:schemeClr val="tx1"/>
-                </a:solidFill>
-              </a:rPr>
-              <a:t>Zeitbedingte </a:t>
-            </a:r>
-            <a:r>
-              <a:rPr lang="de-DE" sz="2500" dirty="0" smtClean="0">
-                <a:solidFill>
-                  <a:schemeClr val="tx1"/>
-                </a:solidFill>
-              </a:rPr>
-              <a:t>Dateninkonsistenz</a:t>
-            </a:r>
-          </a:p>
-          <a:p>
-            <a:pPr marL="457200" indent="-457200">
-              <a:lnSpc>
-                <a:spcPct val="110000"/>
-              </a:lnSpc>
-              <a:buFont typeface="Arial" panose="020B0604020202020204" pitchFamily="34" charset="0"/>
-              <a:buChar char="•"/>
-            </a:pPr>
-            <a:endParaRPr lang="de-DE" sz="2500" dirty="0" smtClean="0"/>
-          </a:p>
-          <a:p>
-            <a:pPr marL="457200" indent="-457200">
-              <a:lnSpc>
-                <a:spcPct val="110000"/>
-              </a:lnSpc>
-              <a:buFont typeface="Arial" panose="020B0604020202020204" pitchFamily="34" charset="0"/>
-              <a:buChar char="•"/>
-            </a:pPr>
-            <a:endParaRPr lang="de-DE" sz="2500" dirty="0" smtClean="0"/>
-          </a:p>
-          <a:p>
-            <a:pPr marL="457200" indent="-457200">
-              <a:lnSpc>
-                <a:spcPct val="110000"/>
-              </a:lnSpc>
-              <a:buFont typeface="Arial" panose="020B0604020202020204" pitchFamily="34" charset="0"/>
-              <a:buChar char="•"/>
-            </a:pPr>
-            <a:endParaRPr lang="de-DE" sz="2500" dirty="0"/>
-          </a:p>
-        </p:txBody>
-      </p:sp>
-      <p:sp>
-        <p:nvSpPr>
-          <p:cNvPr id="5" name="Foliennummernplatzhalter 4"/>
+          <p:cNvPr id="7" name="Foliennummernplatzhalter 6"/>
           <p:cNvSpPr>
             <a:spLocks noGrp="1"/>
           </p:cNvSpPr>
@@ -9979,10 +9699,546 @@
           </a:p>
         </p:txBody>
       </p:sp>
+      <p:sp>
+        <p:nvSpPr>
+          <p:cNvPr id="6" name="Textplatzhalter 2"/>
+          <p:cNvSpPr>
+            <a:spLocks noGrp="1"/>
+          </p:cNvSpPr>
+          <p:nvPr>
+            <p:ph type="body" idx="1"/>
+          </p:nvPr>
+        </p:nvSpPr>
+        <p:spPr>
+          <a:xfrm>
+            <a:off x="1817688" y="1016548"/>
+            <a:ext cx="4790282" cy="5777158"/>
+          </a:xfrm>
+        </p:spPr>
+        <p:txBody>
+          <a:bodyPr anchor="t">
+            <a:normAutofit/>
+          </a:bodyPr>
+          <a:lstStyle/>
+          <a:p>
+            <a:pPr>
+              <a:lnSpc>
+                <a:spcPct val="150000"/>
+              </a:lnSpc>
+              <a:buClrTx/>
+            </a:pPr>
+            <a:r>
+              <a:rPr lang="de-DE" sz="2500" b="1" dirty="0" smtClean="0">
+                <a:solidFill>
+                  <a:schemeClr val="tx1"/>
+                </a:solidFill>
+              </a:rPr>
+              <a:t>Vorteile</a:t>
+            </a:r>
+          </a:p>
+          <a:p>
+            <a:pPr marL="342900" indent="-342900">
+              <a:lnSpc>
+                <a:spcPct val="150000"/>
+              </a:lnSpc>
+              <a:buClrTx/>
+              <a:buFont typeface="Arial" panose="020B0604020202020204" pitchFamily="34" charset="0"/>
+              <a:buChar char="•"/>
+            </a:pPr>
+            <a:r>
+              <a:rPr lang="de-DE" sz="2000" dirty="0" smtClean="0">
+                <a:solidFill>
+                  <a:schemeClr val="tx1"/>
+                </a:solidFill>
+              </a:rPr>
+              <a:t>Eine logische Transaktion</a:t>
+            </a:r>
+          </a:p>
+          <a:p>
+            <a:pPr marL="342900" indent="-342900">
+              <a:lnSpc>
+                <a:spcPct val="150000"/>
+              </a:lnSpc>
+              <a:buClrTx/>
+              <a:buFont typeface="Arial" panose="020B0604020202020204" pitchFamily="34" charset="0"/>
+              <a:buChar char="•"/>
+            </a:pPr>
+            <a:r>
+              <a:rPr lang="de-DE" sz="2000" dirty="0" smtClean="0">
+                <a:solidFill>
+                  <a:schemeClr val="tx1"/>
+                </a:solidFill>
+              </a:rPr>
+              <a:t>Keine </a:t>
+            </a:r>
+            <a:r>
+              <a:rPr lang="de-DE" sz="2000" dirty="0" err="1" smtClean="0">
+                <a:solidFill>
+                  <a:schemeClr val="tx1"/>
+                </a:solidFill>
+              </a:rPr>
+              <a:t>Heuristic-Exceptions</a:t>
+            </a:r>
+            <a:endParaRPr lang="de-DE" sz="2000" dirty="0" smtClean="0">
+              <a:solidFill>
+                <a:schemeClr val="tx1"/>
+              </a:solidFill>
+            </a:endParaRPr>
+          </a:p>
+          <a:p>
+            <a:pPr marL="342900" indent="-342900">
+              <a:lnSpc>
+                <a:spcPct val="150000"/>
+              </a:lnSpc>
+              <a:buClrTx/>
+              <a:buFont typeface="Arial" panose="020B0604020202020204" pitchFamily="34" charset="0"/>
+              <a:buChar char="•"/>
+            </a:pPr>
+            <a:r>
+              <a:rPr lang="de-DE" sz="2000" dirty="0" smtClean="0">
+                <a:solidFill>
+                  <a:schemeClr val="tx1"/>
+                </a:solidFill>
+              </a:rPr>
+              <a:t>Kein Transaktions-Koordinator</a:t>
+            </a:r>
+            <a:endParaRPr lang="de-DE" sz="1500" dirty="0" smtClean="0">
+              <a:solidFill>
+                <a:schemeClr val="tx1"/>
+              </a:solidFill>
+            </a:endParaRPr>
+          </a:p>
+          <a:p>
+            <a:pPr marL="342900" indent="-342900">
+              <a:buClrTx/>
+              <a:buFont typeface="Arial" panose="020B0604020202020204" pitchFamily="34" charset="0"/>
+              <a:buChar char="•"/>
+            </a:pPr>
+            <a:endParaRPr lang="de-DE" sz="1500" dirty="0" smtClean="0">
+              <a:solidFill>
+                <a:schemeClr val="tx1"/>
+              </a:solidFill>
+            </a:endParaRPr>
+          </a:p>
+          <a:p>
+            <a:pPr marL="342900" indent="-342900">
+              <a:lnSpc>
+                <a:spcPct val="200000"/>
+              </a:lnSpc>
+              <a:buClrTx/>
+              <a:buFont typeface="Arial" panose="020B0604020202020204" pitchFamily="34" charset="0"/>
+              <a:buChar char="•"/>
+            </a:pPr>
+            <a:endParaRPr lang="de-DE" sz="1500" dirty="0">
+              <a:solidFill>
+                <a:schemeClr val="tx1"/>
+              </a:solidFill>
+            </a:endParaRPr>
+          </a:p>
+        </p:txBody>
+      </p:sp>
+      <p:sp>
+        <p:nvSpPr>
+          <p:cNvPr id="8" name="Textplatzhalter 2"/>
+          <p:cNvSpPr txBox="1">
+            <a:spLocks/>
+          </p:cNvSpPr>
+          <p:nvPr/>
+        </p:nvSpPr>
+        <p:spPr>
+          <a:xfrm>
+            <a:off x="6687343" y="1016548"/>
+            <a:ext cx="5504657" cy="5777158"/>
+          </a:xfrm>
+          <a:prstGeom prst="rect">
+            <a:avLst/>
+          </a:prstGeom>
+        </p:spPr>
+        <p:txBody>
+          <a:bodyPr vert="horz" lIns="91440" tIns="45720" rIns="91440" bIns="45720" rtlCol="0" anchor="t">
+            <a:normAutofit/>
+          </a:bodyPr>
+          <a:lstStyle>
+            <a:lvl1pPr marL="0" indent="0" algn="l" defTabSz="457200" rtl="0" eaLnBrk="1" latinLnBrk="0" hangingPunct="1">
+              <a:spcBef>
+                <a:spcPts val="1000"/>
+              </a:spcBef>
+              <a:spcAft>
+                <a:spcPts val="0"/>
+              </a:spcAft>
+              <a:buClr>
+                <a:schemeClr val="accent1"/>
+              </a:buClr>
+              <a:buFont typeface="Wingdings 3" charset="2"/>
+              <a:buNone/>
+              <a:defRPr sz="1800" kern="1200">
+                <a:solidFill>
+                  <a:schemeClr val="tx1">
+                    <a:lumMod val="65000"/>
+                    <a:lumOff val="35000"/>
+                  </a:schemeClr>
+                </a:solidFill>
+                <a:latin typeface="+mn-lt"/>
+                <a:ea typeface="+mn-ea"/>
+                <a:cs typeface="+mn-cs"/>
+              </a:defRPr>
+            </a:lvl1pPr>
+            <a:lvl2pPr marL="457200" indent="0" algn="l" defTabSz="457200" rtl="0" eaLnBrk="1" latinLnBrk="0" hangingPunct="1">
+              <a:spcBef>
+                <a:spcPts val="1000"/>
+              </a:spcBef>
+              <a:spcAft>
+                <a:spcPts val="0"/>
+              </a:spcAft>
+              <a:buClr>
+                <a:schemeClr val="accent1"/>
+              </a:buClr>
+              <a:buFont typeface="Wingdings 3" charset="2"/>
+              <a:buNone/>
+              <a:defRPr sz="1800" kern="1200">
+                <a:solidFill>
+                  <a:schemeClr val="tx1">
+                    <a:tint val="75000"/>
+                  </a:schemeClr>
+                </a:solidFill>
+                <a:latin typeface="+mn-lt"/>
+                <a:ea typeface="+mn-ea"/>
+                <a:cs typeface="+mn-cs"/>
+              </a:defRPr>
+            </a:lvl2pPr>
+            <a:lvl3pPr marL="914400" indent="0" algn="l" defTabSz="457200" rtl="0" eaLnBrk="1" latinLnBrk="0" hangingPunct="1">
+              <a:spcBef>
+                <a:spcPts val="1000"/>
+              </a:spcBef>
+              <a:spcAft>
+                <a:spcPts val="0"/>
+              </a:spcAft>
+              <a:buClr>
+                <a:schemeClr val="accent1"/>
+              </a:buClr>
+              <a:buFont typeface="Wingdings 3" charset="2"/>
+              <a:buNone/>
+              <a:defRPr sz="1600" kern="1200">
+                <a:solidFill>
+                  <a:schemeClr val="tx1">
+                    <a:tint val="75000"/>
+                  </a:schemeClr>
+                </a:solidFill>
+                <a:latin typeface="+mn-lt"/>
+                <a:ea typeface="+mn-ea"/>
+                <a:cs typeface="+mn-cs"/>
+              </a:defRPr>
+            </a:lvl3pPr>
+            <a:lvl4pPr marL="1371600" indent="0" algn="l" defTabSz="457200" rtl="0" eaLnBrk="1" latinLnBrk="0" hangingPunct="1">
+              <a:spcBef>
+                <a:spcPts val="1000"/>
+              </a:spcBef>
+              <a:spcAft>
+                <a:spcPts val="0"/>
+              </a:spcAft>
+              <a:buClr>
+                <a:schemeClr val="accent1"/>
+              </a:buClr>
+              <a:buFont typeface="Wingdings 3" charset="2"/>
+              <a:buNone/>
+              <a:defRPr sz="1400" kern="1200">
+                <a:solidFill>
+                  <a:schemeClr val="tx1">
+                    <a:tint val="75000"/>
+                  </a:schemeClr>
+                </a:solidFill>
+                <a:latin typeface="+mn-lt"/>
+                <a:ea typeface="+mn-ea"/>
+                <a:cs typeface="+mn-cs"/>
+              </a:defRPr>
+            </a:lvl4pPr>
+            <a:lvl5pPr marL="1828800" indent="0" algn="l" defTabSz="457200" rtl="0" eaLnBrk="1" latinLnBrk="0" hangingPunct="1">
+              <a:spcBef>
+                <a:spcPts val="1000"/>
+              </a:spcBef>
+              <a:spcAft>
+                <a:spcPts val="0"/>
+              </a:spcAft>
+              <a:buClr>
+                <a:schemeClr val="accent1"/>
+              </a:buClr>
+              <a:buFont typeface="Wingdings 3" charset="2"/>
+              <a:buNone/>
+              <a:defRPr sz="1400" kern="1200">
+                <a:solidFill>
+                  <a:schemeClr val="tx1">
+                    <a:tint val="75000"/>
+                  </a:schemeClr>
+                </a:solidFill>
+                <a:latin typeface="+mn-lt"/>
+                <a:ea typeface="+mn-ea"/>
+                <a:cs typeface="+mn-cs"/>
+              </a:defRPr>
+            </a:lvl5pPr>
+            <a:lvl6pPr marL="2286000" indent="0" algn="l" defTabSz="457200" rtl="0" eaLnBrk="1" latinLnBrk="0" hangingPunct="1">
+              <a:spcBef>
+                <a:spcPts val="1000"/>
+              </a:spcBef>
+              <a:spcAft>
+                <a:spcPts val="0"/>
+              </a:spcAft>
+              <a:buClr>
+                <a:schemeClr val="accent1"/>
+              </a:buClr>
+              <a:buFont typeface="Wingdings 3" charset="2"/>
+              <a:buNone/>
+              <a:defRPr sz="1400" kern="1200">
+                <a:solidFill>
+                  <a:schemeClr val="tx1">
+                    <a:tint val="75000"/>
+                  </a:schemeClr>
+                </a:solidFill>
+                <a:latin typeface="+mn-lt"/>
+                <a:ea typeface="+mn-ea"/>
+                <a:cs typeface="+mn-cs"/>
+              </a:defRPr>
+            </a:lvl6pPr>
+            <a:lvl7pPr marL="2743200" indent="0" algn="l" defTabSz="457200" rtl="0" eaLnBrk="1" latinLnBrk="0" hangingPunct="1">
+              <a:spcBef>
+                <a:spcPts val="1000"/>
+              </a:spcBef>
+              <a:spcAft>
+                <a:spcPts val="0"/>
+              </a:spcAft>
+              <a:buClr>
+                <a:schemeClr val="accent1"/>
+              </a:buClr>
+              <a:buFont typeface="Wingdings 3" charset="2"/>
+              <a:buNone/>
+              <a:defRPr sz="1400" kern="1200">
+                <a:solidFill>
+                  <a:schemeClr val="tx1">
+                    <a:tint val="75000"/>
+                  </a:schemeClr>
+                </a:solidFill>
+                <a:latin typeface="+mn-lt"/>
+                <a:ea typeface="+mn-ea"/>
+                <a:cs typeface="+mn-cs"/>
+              </a:defRPr>
+            </a:lvl7pPr>
+            <a:lvl8pPr marL="3200400" indent="0" algn="l" defTabSz="457200" rtl="0" eaLnBrk="1" latinLnBrk="0" hangingPunct="1">
+              <a:spcBef>
+                <a:spcPts val="1000"/>
+              </a:spcBef>
+              <a:spcAft>
+                <a:spcPts val="0"/>
+              </a:spcAft>
+              <a:buClr>
+                <a:schemeClr val="accent1"/>
+              </a:buClr>
+              <a:buFont typeface="Wingdings 3" charset="2"/>
+              <a:buNone/>
+              <a:defRPr sz="1400" kern="1200">
+                <a:solidFill>
+                  <a:schemeClr val="tx1">
+                    <a:tint val="75000"/>
+                  </a:schemeClr>
+                </a:solidFill>
+                <a:latin typeface="+mn-lt"/>
+                <a:ea typeface="+mn-ea"/>
+                <a:cs typeface="+mn-cs"/>
+              </a:defRPr>
+            </a:lvl8pPr>
+            <a:lvl9pPr marL="3657600" indent="0" algn="l" defTabSz="457200" rtl="0" eaLnBrk="1" latinLnBrk="0" hangingPunct="1">
+              <a:spcBef>
+                <a:spcPts val="1000"/>
+              </a:spcBef>
+              <a:spcAft>
+                <a:spcPts val="0"/>
+              </a:spcAft>
+              <a:buClr>
+                <a:schemeClr val="accent1"/>
+              </a:buClr>
+              <a:buFont typeface="Wingdings 3" charset="2"/>
+              <a:buNone/>
+              <a:defRPr sz="1400" kern="1200">
+                <a:solidFill>
+                  <a:schemeClr val="tx1">
+                    <a:tint val="75000"/>
+                  </a:schemeClr>
+                </a:solidFill>
+                <a:latin typeface="+mn-lt"/>
+                <a:ea typeface="+mn-ea"/>
+                <a:cs typeface="+mn-cs"/>
+              </a:defRPr>
+            </a:lvl9pPr>
+          </a:lstStyle>
+          <a:p>
+            <a:pPr>
+              <a:lnSpc>
+                <a:spcPct val="150000"/>
+              </a:lnSpc>
+              <a:buClrTx/>
+            </a:pPr>
+            <a:r>
+              <a:rPr lang="de-DE" sz="2500" b="1" dirty="0" smtClean="0">
+                <a:solidFill>
+                  <a:schemeClr val="tx1"/>
+                </a:solidFill>
+              </a:rPr>
+              <a:t>Nachteile</a:t>
+            </a:r>
+          </a:p>
+          <a:p>
+            <a:pPr marL="342900" indent="-342900">
+              <a:lnSpc>
+                <a:spcPct val="150000"/>
+              </a:lnSpc>
+              <a:buClrTx/>
+              <a:buFont typeface="Arial" panose="020B0604020202020204" pitchFamily="34" charset="0"/>
+              <a:buChar char="•"/>
+            </a:pPr>
+            <a:r>
+              <a:rPr lang="de-DE" sz="2000" dirty="0" smtClean="0">
+                <a:solidFill>
+                  <a:schemeClr val="tx1"/>
+                </a:solidFill>
+              </a:rPr>
+              <a:t>Starke Kopplung </a:t>
+            </a:r>
+          </a:p>
+          <a:p>
+            <a:pPr marL="342900" indent="-342900">
+              <a:lnSpc>
+                <a:spcPct val="150000"/>
+              </a:lnSpc>
+              <a:buClrTx/>
+              <a:buFont typeface="Arial" panose="020B0604020202020204" pitchFamily="34" charset="0"/>
+              <a:buChar char="•"/>
+            </a:pPr>
+            <a:r>
+              <a:rPr lang="de-DE" sz="2000" dirty="0" smtClean="0">
+                <a:solidFill>
+                  <a:schemeClr val="tx1"/>
+                </a:solidFill>
+              </a:rPr>
+              <a:t>Schwergewichtige Client-API</a:t>
+            </a:r>
+          </a:p>
+          <a:p>
+            <a:pPr marL="342900" indent="-342900">
+              <a:lnSpc>
+                <a:spcPct val="150000"/>
+              </a:lnSpc>
+              <a:buClrTx/>
+              <a:buFont typeface="Arial" panose="020B0604020202020204" pitchFamily="34" charset="0"/>
+              <a:buChar char="•"/>
+            </a:pPr>
+            <a:r>
+              <a:rPr lang="de-DE" sz="2000" dirty="0" smtClean="0">
+                <a:solidFill>
+                  <a:schemeClr val="tx1"/>
+                </a:solidFill>
+              </a:rPr>
+              <a:t>Starke Abhängigkeiten</a:t>
+            </a:r>
+            <a:endParaRPr lang="de-DE" sz="2000" dirty="0">
+              <a:solidFill>
+                <a:schemeClr val="tx1"/>
+              </a:solidFill>
+            </a:endParaRPr>
+          </a:p>
+          <a:p>
+            <a:pPr marL="342900" indent="-342900">
+              <a:lnSpc>
+                <a:spcPct val="150000"/>
+              </a:lnSpc>
+              <a:buClrTx/>
+              <a:buFont typeface="Arial" panose="020B0604020202020204" pitchFamily="34" charset="0"/>
+              <a:buChar char="•"/>
+            </a:pPr>
+            <a:r>
+              <a:rPr lang="de-DE" sz="2000" dirty="0" smtClean="0">
+                <a:solidFill>
+                  <a:schemeClr val="tx1"/>
+                </a:solidFill>
+              </a:rPr>
+              <a:t>Technologische Unterschiede</a:t>
+            </a:r>
+          </a:p>
+          <a:p>
+            <a:pPr marL="342900" indent="-342900">
+              <a:lnSpc>
+                <a:spcPct val="150000"/>
+              </a:lnSpc>
+              <a:buClrTx/>
+              <a:buFont typeface="Arial" panose="020B0604020202020204" pitchFamily="34" charset="0"/>
+              <a:buChar char="•"/>
+            </a:pPr>
+            <a:endParaRPr lang="de-DE" sz="2000" dirty="0" smtClean="0">
+              <a:solidFill>
+                <a:schemeClr val="tx1"/>
+              </a:solidFill>
+            </a:endParaRPr>
+          </a:p>
+          <a:p>
+            <a:pPr marL="342900" indent="-342900">
+              <a:lnSpc>
+                <a:spcPct val="150000"/>
+              </a:lnSpc>
+              <a:buClrTx/>
+              <a:buFont typeface="Arial" panose="020B0604020202020204" pitchFamily="34" charset="0"/>
+              <a:buChar char="•"/>
+            </a:pPr>
+            <a:endParaRPr lang="de-DE" dirty="0" smtClean="0">
+              <a:solidFill>
+                <a:schemeClr val="tx1"/>
+              </a:solidFill>
+            </a:endParaRPr>
+          </a:p>
+          <a:p>
+            <a:pPr marL="342900" indent="-342900">
+              <a:lnSpc>
+                <a:spcPct val="150000"/>
+              </a:lnSpc>
+              <a:buClrTx/>
+              <a:buFont typeface="Arial" panose="020B0604020202020204" pitchFamily="34" charset="0"/>
+              <a:buChar char="•"/>
+            </a:pPr>
+            <a:endParaRPr lang="de-DE" sz="1500" dirty="0" smtClean="0">
+              <a:solidFill>
+                <a:schemeClr val="tx1"/>
+              </a:solidFill>
+            </a:endParaRPr>
+          </a:p>
+          <a:p>
+            <a:pPr marL="342900" indent="-342900">
+              <a:buClrTx/>
+              <a:buFont typeface="Arial" panose="020B0604020202020204" pitchFamily="34" charset="0"/>
+              <a:buChar char="•"/>
+            </a:pPr>
+            <a:endParaRPr lang="de-DE" sz="1500" dirty="0" smtClean="0">
+              <a:solidFill>
+                <a:schemeClr val="tx1"/>
+              </a:solidFill>
+            </a:endParaRPr>
+          </a:p>
+          <a:p>
+            <a:pPr marL="342900" indent="-342900">
+              <a:lnSpc>
+                <a:spcPct val="200000"/>
+              </a:lnSpc>
+              <a:buClrTx/>
+              <a:buFont typeface="Arial" panose="020B0604020202020204" pitchFamily="34" charset="0"/>
+              <a:buChar char="•"/>
+            </a:pPr>
+            <a:endParaRPr lang="de-DE" sz="1500" dirty="0">
+              <a:solidFill>
+                <a:schemeClr val="tx1"/>
+              </a:solidFill>
+            </a:endParaRPr>
+          </a:p>
+        </p:txBody>
+      </p:sp>
     </p:spTree>
     <p:extLst>
       <p:ext uri="{BB962C8B-B14F-4D97-AF65-F5344CB8AC3E}">
-        <p14:creationId xmlns:p14="http://schemas.microsoft.com/office/powerpoint/2010/main" val="3072086596"/>
+        <p14:creationId xmlns:p14="http://schemas.microsoft.com/office/powerpoint/2010/main" val="365822037"/>
       </p:ext>
     </p:extLst>
   </p:cSld>
@@ -10021,8 +10277,8 @@
         </p:nvSpPr>
         <p:spPr>
           <a:xfrm>
-            <a:off x="2589212" y="182160"/>
-            <a:ext cx="8915399" cy="1005840"/>
+            <a:off x="0" y="10708"/>
+            <a:ext cx="12192000" cy="1005840"/>
           </a:xfrm>
         </p:spPr>
         <p:txBody>
@@ -10031,13 +10287,10 @@
           </a:bodyPr>
           <a:lstStyle/>
           <a:p>
-            <a:r>
-              <a:rPr lang="de-DE" dirty="0" err="1" smtClean="0"/>
-              <a:t>CCMail</a:t>
-            </a:r>
+            <a:pPr algn="ctr"/>
             <a:r>
               <a:rPr lang="de-DE" dirty="0" smtClean="0"/>
-              <a:t> Dateninkonsistenz</a:t>
+              <a:t>Mailing Prozess</a:t>
             </a:r>
             <a:endParaRPr lang="de-DE" dirty="0"/>
           </a:p>
@@ -10069,7 +10322,7 @@
       </p:sp>
       <p:pic>
         <p:nvPicPr>
-          <p:cNvPr id="6" name="Grafik 5"/>
+          <p:cNvPr id="5" name="Grafik 4"/>
           <p:cNvPicPr>
             <a:picLocks noChangeAspect="1"/>
           </p:cNvPicPr>
@@ -10083,8 +10336,8 @@
         </p:blipFill>
         <p:spPr>
           <a:xfrm>
-            <a:off x="2589211" y="1188000"/>
-            <a:ext cx="9365941" cy="5448544"/>
+            <a:off x="2218928" y="1033037"/>
+            <a:ext cx="7754144" cy="5824963"/>
           </a:xfrm>
           <a:prstGeom prst="rect">
             <a:avLst/>
@@ -10094,7 +10347,7 @@
     </p:spTree>
     <p:extLst>
       <p:ext uri="{BB962C8B-B14F-4D97-AF65-F5344CB8AC3E}">
-        <p14:creationId xmlns:p14="http://schemas.microsoft.com/office/powerpoint/2010/main" val="697617532"/>
+        <p14:creationId xmlns:p14="http://schemas.microsoft.com/office/powerpoint/2010/main" val="3378946692"/>
       </p:ext>
     </p:extLst>
   </p:cSld>
@@ -10133,8 +10386,8 @@
         </p:nvSpPr>
         <p:spPr>
           <a:xfrm>
-            <a:off x="2589212" y="182160"/>
-            <a:ext cx="8915399" cy="1005840"/>
+            <a:off x="0" y="10708"/>
+            <a:ext cx="12192000" cy="1005840"/>
           </a:xfrm>
         </p:spPr>
         <p:txBody>
@@ -10143,9 +10396,10 @@
           </a:bodyPr>
           <a:lstStyle/>
           <a:p>
+            <a:pPr algn="ctr"/>
             <a:r>
               <a:rPr lang="de-DE" dirty="0" smtClean="0"/>
-              <a:t>Anforderungen</a:t>
+              <a:t>E-Mail-Template</a:t>
             </a:r>
             <a:endParaRPr lang="de-DE" dirty="0"/>
           </a:p>
@@ -10153,252 +10407,7 @@
       </p:sp>
       <p:sp>
         <p:nvSpPr>
-          <p:cNvPr id="5" name="Textplatzhalter 8"/>
-          <p:cNvSpPr>
-            <a:spLocks noGrp="1"/>
-          </p:cNvSpPr>
-          <p:nvPr>
-            <p:ph type="body" idx="1"/>
-          </p:nvPr>
-        </p:nvSpPr>
-        <p:spPr>
-          <a:xfrm>
-            <a:off x="2589212" y="1188000"/>
-            <a:ext cx="9413188" cy="5529600"/>
-          </a:xfrm>
-        </p:spPr>
-        <p:txBody>
-          <a:bodyPr anchor="t">
-            <a:normAutofit/>
-          </a:bodyPr>
-          <a:lstStyle/>
-          <a:p>
-            <a:pPr marL="457200" indent="-457200">
-              <a:lnSpc>
-                <a:spcPct val="110000"/>
-              </a:lnSpc>
-              <a:buClr>
-                <a:schemeClr val="tx1"/>
-              </a:buClr>
-              <a:buFont typeface="Arial" panose="020B0604020202020204" pitchFamily="34" charset="0"/>
-              <a:buChar char="•"/>
-            </a:pPr>
-            <a:r>
-              <a:rPr lang="de-DE" sz="2500" b="1" dirty="0" err="1">
-                <a:solidFill>
-                  <a:srgbClr val="C00000"/>
-                </a:solidFill>
-              </a:rPr>
-              <a:t>Transaktionalität</a:t>
-            </a:r>
-            <a:r>
-              <a:rPr lang="de-DE" sz="2500" b="1" dirty="0">
-                <a:solidFill>
-                  <a:srgbClr val="C00000"/>
-                </a:solidFill>
-              </a:rPr>
-              <a:t> </a:t>
-            </a:r>
-            <a:r>
-              <a:rPr lang="de-DE" sz="2500" b="1" dirty="0" smtClean="0">
-                <a:solidFill>
-                  <a:srgbClr val="C00000"/>
-                </a:solidFill>
-              </a:rPr>
-              <a:t>!</a:t>
-            </a:r>
-            <a:endParaRPr lang="de-DE" sz="2500" b="1" dirty="0">
-              <a:solidFill>
-                <a:srgbClr val="C00000"/>
-              </a:solidFill>
-            </a:endParaRPr>
-          </a:p>
-          <a:p>
-            <a:pPr marL="457200" indent="-457200">
-              <a:lnSpc>
-                <a:spcPct val="110000"/>
-              </a:lnSpc>
-              <a:buClr>
-                <a:schemeClr val="tx1"/>
-              </a:buClr>
-              <a:buFont typeface="Arial" panose="020B0604020202020204" pitchFamily="34" charset="0"/>
-              <a:buChar char="•"/>
-            </a:pPr>
-            <a:r>
-              <a:rPr lang="de-DE" sz="2500" dirty="0" smtClean="0">
-                <a:solidFill>
-                  <a:schemeClr val="tx1"/>
-                </a:solidFill>
-              </a:rPr>
-              <a:t>Nachverfolgbarkeit</a:t>
-            </a:r>
-          </a:p>
-          <a:p>
-            <a:pPr marL="457200" indent="-457200">
-              <a:lnSpc>
-                <a:spcPct val="110000"/>
-              </a:lnSpc>
-              <a:buClr>
-                <a:schemeClr val="tx1"/>
-              </a:buClr>
-              <a:buFont typeface="Arial" panose="020B0604020202020204" pitchFamily="34" charset="0"/>
-              <a:buChar char="•"/>
-            </a:pPr>
-            <a:r>
-              <a:rPr lang="de-DE" sz="2500" dirty="0" smtClean="0">
-                <a:solidFill>
-                  <a:schemeClr val="tx1"/>
-                </a:solidFill>
-              </a:rPr>
-              <a:t>Wiederversendbarkeit</a:t>
-            </a:r>
-          </a:p>
-          <a:p>
-            <a:pPr marL="457200" indent="-457200">
-              <a:lnSpc>
-                <a:spcPct val="110000"/>
-              </a:lnSpc>
-              <a:buClr>
-                <a:schemeClr val="tx1"/>
-              </a:buClr>
-              <a:buFont typeface="Arial" panose="020B0604020202020204" pitchFamily="34" charset="0"/>
-              <a:buChar char="•"/>
-            </a:pPr>
-            <a:r>
-              <a:rPr lang="de-DE" sz="2500" dirty="0" err="1" smtClean="0">
-                <a:solidFill>
-                  <a:schemeClr val="tx1"/>
-                </a:solidFill>
-              </a:rPr>
-              <a:t>Freemarker</a:t>
-            </a:r>
-            <a:r>
-              <a:rPr lang="de-DE" sz="2500" dirty="0" smtClean="0">
-                <a:solidFill>
-                  <a:schemeClr val="tx1"/>
-                </a:solidFill>
-              </a:rPr>
-              <a:t>-Template</a:t>
-            </a:r>
-            <a:r>
-              <a:rPr lang="de-DE" sz="2500" dirty="0">
-                <a:solidFill>
-                  <a:schemeClr val="tx1"/>
-                </a:solidFill>
-              </a:rPr>
-              <a:t>s</a:t>
-            </a:r>
-            <a:endParaRPr lang="de-DE" sz="2500" dirty="0" smtClean="0">
-              <a:solidFill>
-                <a:schemeClr val="tx1"/>
-              </a:solidFill>
-            </a:endParaRPr>
-          </a:p>
-          <a:p>
-            <a:pPr marL="457200" indent="-457200">
-              <a:lnSpc>
-                <a:spcPct val="110000"/>
-              </a:lnSpc>
-              <a:buClr>
-                <a:schemeClr val="tx1"/>
-              </a:buClr>
-              <a:buFont typeface="Arial" panose="020B0604020202020204" pitchFamily="34" charset="0"/>
-              <a:buChar char="•"/>
-            </a:pPr>
-            <a:r>
-              <a:rPr lang="de-DE" sz="2500" dirty="0" smtClean="0">
-                <a:solidFill>
-                  <a:schemeClr val="tx1"/>
-                </a:solidFill>
-              </a:rPr>
-              <a:t>Vorlagen auf Entitäten-Ebene</a:t>
-            </a:r>
-          </a:p>
-          <a:p>
-            <a:pPr marL="457200" indent="-457200">
-              <a:lnSpc>
-                <a:spcPct val="110000"/>
-              </a:lnSpc>
-              <a:buClr>
-                <a:schemeClr val="tx1"/>
-              </a:buClr>
-              <a:buFont typeface="Arial" panose="020B0604020202020204" pitchFamily="34" charset="0"/>
-              <a:buChar char="•"/>
-            </a:pPr>
-            <a:r>
-              <a:rPr lang="de-DE" sz="2500" dirty="0" smtClean="0">
-                <a:solidFill>
-                  <a:schemeClr val="tx1"/>
-                </a:solidFill>
-              </a:rPr>
-              <a:t>Einheitliche Schnittstelle</a:t>
-            </a:r>
-          </a:p>
-          <a:p>
-            <a:pPr marL="457200" indent="-457200">
-              <a:lnSpc>
-                <a:spcPct val="110000"/>
-              </a:lnSpc>
-              <a:buClr>
-                <a:schemeClr val="tx1"/>
-              </a:buClr>
-              <a:buFont typeface="Arial" panose="020B0604020202020204" pitchFamily="34" charset="0"/>
-              <a:buChar char="•"/>
-            </a:pPr>
-            <a:r>
-              <a:rPr lang="de-DE" sz="2500" dirty="0" smtClean="0">
-                <a:solidFill>
-                  <a:schemeClr val="tx1"/>
-                </a:solidFill>
-              </a:rPr>
-              <a:t>Hohes Abstraktionsniveau</a:t>
-            </a:r>
-          </a:p>
-          <a:p>
-            <a:pPr marL="457200" indent="-457200">
-              <a:lnSpc>
-                <a:spcPct val="110000"/>
-              </a:lnSpc>
-              <a:buClr>
-                <a:schemeClr val="tx1"/>
-              </a:buClr>
-              <a:buFont typeface="Arial" panose="020B0604020202020204" pitchFamily="34" charset="0"/>
-              <a:buChar char="•"/>
-            </a:pPr>
-            <a:r>
-              <a:rPr lang="de-DE" sz="2500" dirty="0" smtClean="0">
-                <a:solidFill>
-                  <a:schemeClr val="tx1"/>
-                </a:solidFill>
-              </a:rPr>
-              <a:t>Gebündelte E-Mails</a:t>
-            </a:r>
-          </a:p>
-          <a:p>
-            <a:pPr marL="457200" indent="-457200">
-              <a:lnSpc>
-                <a:spcPct val="110000"/>
-              </a:lnSpc>
-              <a:buClr>
-                <a:schemeClr val="tx1"/>
-              </a:buClr>
-              <a:buFont typeface="Arial" panose="020B0604020202020204" pitchFamily="34" charset="0"/>
-              <a:buChar char="•"/>
-            </a:pPr>
-            <a:r>
-              <a:rPr lang="de-DE" sz="2500" dirty="0" smtClean="0">
-                <a:solidFill>
-                  <a:schemeClr val="tx1"/>
-                </a:solidFill>
-              </a:rPr>
-              <a:t>Zeitgesteuerter Versand</a:t>
-            </a:r>
-          </a:p>
-        </p:txBody>
-      </p:sp>
-      <p:sp>
-        <p:nvSpPr>
-          <p:cNvPr id="6" name="Foliennummernplatzhalter 5"/>
+          <p:cNvPr id="7" name="Foliennummernplatzhalter 6"/>
           <p:cNvSpPr>
             <a:spLocks noGrp="1"/>
           </p:cNvSpPr>
@@ -10420,10 +10429,199 @@
           </a:p>
         </p:txBody>
       </p:sp>
+      <p:pic>
+        <p:nvPicPr>
+          <p:cNvPr id="3" name="Grafik 2"/>
+          <p:cNvPicPr>
+            <a:picLocks noChangeAspect="1"/>
+          </p:cNvPicPr>
+          <p:nvPr/>
+        </p:nvPicPr>
+        <p:blipFill>
+          <a:blip r:embed="rId2"/>
+          <a:stretch>
+            <a:fillRect/>
+          </a:stretch>
+        </p:blipFill>
+        <p:spPr>
+          <a:xfrm>
+            <a:off x="1695977" y="1259827"/>
+            <a:ext cx="5568629" cy="4333748"/>
+          </a:xfrm>
+          <a:prstGeom prst="rect">
+            <a:avLst/>
+          </a:prstGeom>
+        </p:spPr>
+      </p:pic>
+      <p:sp>
+        <p:nvSpPr>
+          <p:cNvPr id="8" name="Textplatzhalter 2"/>
+          <p:cNvSpPr>
+            <a:spLocks noGrp="1"/>
+          </p:cNvSpPr>
+          <p:nvPr>
+            <p:ph type="body" idx="1"/>
+          </p:nvPr>
+        </p:nvSpPr>
+        <p:spPr>
+          <a:xfrm>
+            <a:off x="7264606" y="1016548"/>
+            <a:ext cx="4851194" cy="5727152"/>
+          </a:xfrm>
+        </p:spPr>
+        <p:txBody>
+          <a:bodyPr anchor="t">
+            <a:normAutofit/>
+          </a:bodyPr>
+          <a:lstStyle/>
+          <a:p>
+            <a:pPr marL="342900" indent="-342900">
+              <a:lnSpc>
+                <a:spcPct val="200000"/>
+              </a:lnSpc>
+              <a:buClrTx/>
+              <a:buFont typeface="Arial" panose="020B0604020202020204" pitchFamily="34" charset="0"/>
+              <a:buChar char="•"/>
+            </a:pPr>
+            <a:r>
+              <a:rPr lang="de-DE" sz="2000" dirty="0">
+                <a:solidFill>
+                  <a:schemeClr val="tx1"/>
+                </a:solidFill>
+              </a:rPr>
+              <a:t>JSON-Schema </a:t>
+            </a:r>
+            <a:r>
+              <a:rPr lang="de-DE" sz="2000" dirty="0" smtClean="0">
+                <a:solidFill>
+                  <a:schemeClr val="tx1"/>
+                </a:solidFill>
+              </a:rPr>
+              <a:t>als Spezifikation</a:t>
+            </a:r>
+          </a:p>
+          <a:p>
+            <a:pPr marL="342900" indent="-342900">
+              <a:lnSpc>
+                <a:spcPct val="200000"/>
+              </a:lnSpc>
+              <a:buClrTx/>
+              <a:buFont typeface="Arial" panose="020B0604020202020204" pitchFamily="34" charset="0"/>
+              <a:buChar char="•"/>
+            </a:pPr>
+            <a:r>
+              <a:rPr lang="de-DE" sz="2000" dirty="0" smtClean="0">
+                <a:solidFill>
+                  <a:schemeClr val="tx1"/>
+                </a:solidFill>
+              </a:rPr>
+              <a:t>Parameter filtern</a:t>
+            </a:r>
+          </a:p>
+          <a:p>
+            <a:pPr marL="342900" indent="-342900">
+              <a:lnSpc>
+                <a:spcPct val="200000"/>
+              </a:lnSpc>
+              <a:buClrTx/>
+              <a:buFont typeface="Arial" panose="020B0604020202020204" pitchFamily="34" charset="0"/>
+              <a:buChar char="•"/>
+            </a:pPr>
+            <a:r>
+              <a:rPr lang="de-DE" sz="2000" dirty="0" smtClean="0">
+                <a:solidFill>
+                  <a:schemeClr val="tx1"/>
+                </a:solidFill>
+              </a:rPr>
+              <a:t>Template-Engine </a:t>
+            </a:r>
+            <a:r>
+              <a:rPr lang="de-DE" sz="2000" dirty="0" err="1" smtClean="0">
+                <a:solidFill>
+                  <a:schemeClr val="tx1"/>
+                </a:solidFill>
+              </a:rPr>
+              <a:t>Freemarker</a:t>
+            </a:r>
+            <a:endParaRPr lang="de-DE" sz="2000" dirty="0" smtClean="0">
+              <a:solidFill>
+                <a:schemeClr val="tx1"/>
+              </a:solidFill>
+            </a:endParaRPr>
+          </a:p>
+          <a:p>
+            <a:pPr marL="342900" indent="-342900">
+              <a:lnSpc>
+                <a:spcPct val="200000"/>
+              </a:lnSpc>
+              <a:buClrTx/>
+              <a:buFont typeface="Arial" panose="020B0604020202020204" pitchFamily="34" charset="0"/>
+              <a:buChar char="•"/>
+            </a:pPr>
+            <a:r>
+              <a:rPr lang="de-DE" sz="2000" dirty="0" smtClean="0">
+                <a:solidFill>
+                  <a:schemeClr val="tx1"/>
+                </a:solidFill>
+              </a:rPr>
+              <a:t>Codeblock/Rich-Editor</a:t>
+            </a:r>
+          </a:p>
+          <a:p>
+            <a:pPr marL="342900" indent="-342900">
+              <a:lnSpc>
+                <a:spcPct val="200000"/>
+              </a:lnSpc>
+              <a:buClrTx/>
+              <a:buFont typeface="Arial" panose="020B0604020202020204" pitchFamily="34" charset="0"/>
+              <a:buChar char="•"/>
+            </a:pPr>
+            <a:r>
+              <a:rPr lang="de-DE" sz="2000" dirty="0" smtClean="0">
+                <a:solidFill>
+                  <a:schemeClr val="tx1"/>
+                </a:solidFill>
+              </a:rPr>
+              <a:t>Template Lokalisierung</a:t>
+            </a:r>
+          </a:p>
+          <a:p>
+            <a:pPr marL="342900" indent="-342900">
+              <a:lnSpc>
+                <a:spcPct val="200000"/>
+              </a:lnSpc>
+              <a:buClrTx/>
+              <a:buFont typeface="Arial" panose="020B0604020202020204" pitchFamily="34" charset="0"/>
+              <a:buChar char="•"/>
+            </a:pPr>
+            <a:r>
+              <a:rPr lang="de-DE" sz="2000" dirty="0" smtClean="0">
+                <a:solidFill>
+                  <a:schemeClr val="tx1"/>
+                </a:solidFill>
+              </a:rPr>
+              <a:t>Template </a:t>
+            </a:r>
+            <a:r>
+              <a:rPr lang="de-DE" sz="2000" dirty="0" err="1" smtClean="0">
+                <a:solidFill>
+                  <a:schemeClr val="tx1"/>
+                </a:solidFill>
+              </a:rPr>
+              <a:t>Versionierung</a:t>
+            </a:r>
+            <a:endParaRPr lang="de-DE" sz="2000" dirty="0">
+              <a:solidFill>
+                <a:schemeClr val="tx1"/>
+              </a:solidFill>
+            </a:endParaRPr>
+          </a:p>
+        </p:txBody>
+      </p:sp>
     </p:spTree>
     <p:extLst>
       <p:ext uri="{BB962C8B-B14F-4D97-AF65-F5344CB8AC3E}">
-        <p14:creationId xmlns:p14="http://schemas.microsoft.com/office/powerpoint/2010/main" val="3173056318"/>
+        <p14:creationId xmlns:p14="http://schemas.microsoft.com/office/powerpoint/2010/main" val="3886779759"/>
       </p:ext>
     </p:extLst>
   </p:cSld>
@@ -10462,8 +10660,8 @@
         </p:nvSpPr>
         <p:spPr>
           <a:xfrm>
-            <a:off x="2589212" y="182160"/>
-            <a:ext cx="8915399" cy="1005840"/>
+            <a:off x="0" y="10708"/>
+            <a:ext cx="12192000" cy="1005840"/>
           </a:xfrm>
         </p:spPr>
         <p:txBody>
@@ -10472,9 +10670,18 @@
           </a:bodyPr>
           <a:lstStyle/>
           <a:p>
+            <a:pPr algn="ctr"/>
+            <a:r>
+              <a:rPr lang="de-DE" dirty="0" err="1" smtClean="0"/>
+              <a:t>CleverMail</a:t>
+            </a:r>
+            <a:r>
+              <a:rPr lang="de-DE" dirty="0"/>
+              <a:t> </a:t>
+            </a:r>
             <a:r>
               <a:rPr lang="de-DE" dirty="0" smtClean="0"/>
-              <a:t>Konzept</a:t>
+              <a:t>DB-Schema</a:t>
             </a:r>
             <a:endParaRPr lang="de-DE" dirty="0"/>
           </a:p>
@@ -10482,58 +10689,31 @@
       </p:sp>
       <p:sp>
         <p:nvSpPr>
-          <p:cNvPr id="5" name="Textplatzhalter 8"/>
-          <p:cNvSpPr>
-            <a:spLocks noGrp="1"/>
-          </p:cNvSpPr>
-          <p:nvPr>
-            <p:ph type="body" idx="1"/>
-          </p:nvPr>
-        </p:nvSpPr>
-        <p:spPr>
-          <a:xfrm>
-            <a:off x="2589212" y="6444000"/>
-            <a:ext cx="9413188" cy="273600"/>
-          </a:xfrm>
-        </p:spPr>
-        <p:txBody>
-          <a:bodyPr anchor="t">
-            <a:normAutofit fontScale="47500" lnSpcReduction="20000"/>
-          </a:bodyPr>
+          <p:cNvPr id="7" name="Foliennummernplatzhalter 6"/>
+          <p:cNvSpPr>
+            <a:spLocks noGrp="1"/>
+          </p:cNvSpPr>
+          <p:nvPr>
+            <p:ph type="sldNum" sz="quarter" idx="12"/>
+          </p:nvPr>
+        </p:nvSpPr>
+        <p:spPr/>
+        <p:txBody>
+          <a:bodyPr/>
           <a:lstStyle/>
           <a:p>
-            <a:pPr>
-              <a:lnSpc>
-                <a:spcPct val="110000"/>
-              </a:lnSpc>
-            </a:pPr>
-            <a:endParaRPr lang="de-DE" sz="2500" dirty="0" smtClean="0"/>
-          </a:p>
-          <a:p>
-            <a:pPr marL="457200" indent="-457200">
-              <a:lnSpc>
-                <a:spcPct val="110000"/>
-              </a:lnSpc>
-              <a:buFont typeface="Arial" panose="020B0604020202020204" pitchFamily="34" charset="0"/>
-              <a:buChar char="•"/>
-            </a:pPr>
-            <a:endParaRPr lang="de-DE" sz="2500" dirty="0" smtClean="0"/>
-          </a:p>
-          <a:p>
-            <a:pPr marL="457200" indent="-457200">
-              <a:lnSpc>
-                <a:spcPct val="110000"/>
-              </a:lnSpc>
-              <a:buFont typeface="Arial" panose="020B0604020202020204" pitchFamily="34" charset="0"/>
-              <a:buChar char="•"/>
-            </a:pPr>
-            <a:endParaRPr lang="de-DE" sz="2500" dirty="0"/>
+            <a:fld id="{D57F1E4F-1CFF-5643-939E-217C01CDF565}" type="slidenum">
+              <a:rPr lang="en-US" b="1" smtClean="0"/>
+              <a:pPr/>
+              <a:t>9</a:t>
+            </a:fld>
+            <a:endParaRPr lang="en-US" b="1" dirty="0"/>
           </a:p>
         </p:txBody>
       </p:sp>
       <p:pic>
         <p:nvPicPr>
-          <p:cNvPr id="3" name="Grafik 2"/>
+          <p:cNvPr id="10" name="Grafik 9"/>
           <p:cNvPicPr>
             <a:picLocks noChangeAspect="1"/>
           </p:cNvPicPr>
@@ -10547,42 +10727,18 @@
         </p:blipFill>
         <p:spPr>
           <a:xfrm>
-            <a:off x="2589212" y="1631825"/>
-            <a:ext cx="9305810" cy="4368350"/>
+            <a:off x="1628774" y="1552329"/>
+            <a:ext cx="10481341" cy="4677021"/>
           </a:xfrm>
           <a:prstGeom prst="rect">
             <a:avLst/>
           </a:prstGeom>
         </p:spPr>
       </p:pic>
-      <p:sp>
-        <p:nvSpPr>
-          <p:cNvPr id="7" name="Foliennummernplatzhalter 6"/>
-          <p:cNvSpPr>
-            <a:spLocks noGrp="1"/>
-          </p:cNvSpPr>
-          <p:nvPr>
-            <p:ph type="sldNum" sz="quarter" idx="12"/>
-          </p:nvPr>
-        </p:nvSpPr>
-        <p:spPr/>
-        <p:txBody>
-          <a:bodyPr/>
-          <a:lstStyle/>
-          <a:p>
-            <a:fld id="{D57F1E4F-1CFF-5643-939E-217C01CDF565}" type="slidenum">
-              <a:rPr lang="en-US" b="1" smtClean="0"/>
-              <a:pPr/>
-              <a:t>9</a:t>
-            </a:fld>
-            <a:endParaRPr lang="en-US" b="1" dirty="0"/>
-          </a:p>
-        </p:txBody>
-      </p:sp>
     </p:spTree>
     <p:extLst>
       <p:ext uri="{BB962C8B-B14F-4D97-AF65-F5344CB8AC3E}">
-        <p14:creationId xmlns:p14="http://schemas.microsoft.com/office/powerpoint/2010/main" val="1156336460"/>
+        <p14:creationId xmlns:p14="http://schemas.microsoft.com/office/powerpoint/2010/main" val="358556099"/>
       </p:ext>
     </p:extLst>
   </p:cSld>

</xml_diff>